<commit_message>
Site updated: 2024-05-11 20:06:26
</commit_message>
<xml_diff>
--- a/asset/舒适写作大法/figure.pptx
+++ b/asset/舒适写作大法/figure.pptx
@@ -6,6 +6,8 @@
   </p:sldMasterIdLst>
   <p:sldIdLst>
     <p:sldId id="256" r:id="rId2"/>
+    <p:sldId id="257" r:id="rId3"/>
+    <p:sldId id="258" r:id="rId4"/>
   </p:sldIdLst>
   <p:sldSz cx="12192000" cy="6858000"/>
   <p:notesSz cx="6858000" cy="9144000"/>
@@ -104,6 +106,11 @@
       </a:defRPr>
     </a:lvl9pPr>
   </p:defaultTextStyle>
+  <p:extLst>
+    <p:ext uri="{EFAFB233-063F-42B5-8137-9DF3F51BA10A}">
+      <p15:sldGuideLst xmlns:p15="http://schemas.microsoft.com/office/powerpoint/2012/main"/>
+    </p:ext>
+  </p:extLst>
 </p:presentation>
 </file>
 
@@ -254,7 +261,7 @@
           <a:p>
             <a:fld id="{E62BEFD4-20EB-4A6A-A610-85E2DAC37D91}" type="datetimeFigureOut">
               <a:rPr lang="zh-CN" altLang="en-US" smtClean="0"/>
-              <a:t>2024/05/08</a:t>
+              <a:t>2024/05/11</a:t>
             </a:fld>
             <a:endParaRPr lang="zh-CN" altLang="en-US"/>
           </a:p>
@@ -452,7 +459,7 @@
           <a:p>
             <a:fld id="{E62BEFD4-20EB-4A6A-A610-85E2DAC37D91}" type="datetimeFigureOut">
               <a:rPr lang="zh-CN" altLang="en-US" smtClean="0"/>
-              <a:t>2024/05/08</a:t>
+              <a:t>2024/05/11</a:t>
             </a:fld>
             <a:endParaRPr lang="zh-CN" altLang="en-US"/>
           </a:p>
@@ -660,7 +667,7 @@
           <a:p>
             <a:fld id="{E62BEFD4-20EB-4A6A-A610-85E2DAC37D91}" type="datetimeFigureOut">
               <a:rPr lang="zh-CN" altLang="en-US" smtClean="0"/>
-              <a:t>2024/05/08</a:t>
+              <a:t>2024/05/11</a:t>
             </a:fld>
             <a:endParaRPr lang="zh-CN" altLang="en-US"/>
           </a:p>
@@ -858,7 +865,7 @@
           <a:p>
             <a:fld id="{E62BEFD4-20EB-4A6A-A610-85E2DAC37D91}" type="datetimeFigureOut">
               <a:rPr lang="zh-CN" altLang="en-US" smtClean="0"/>
-              <a:t>2024/05/08</a:t>
+              <a:t>2024/05/11</a:t>
             </a:fld>
             <a:endParaRPr lang="zh-CN" altLang="en-US"/>
           </a:p>
@@ -1133,7 +1140,7 @@
           <a:p>
             <a:fld id="{E62BEFD4-20EB-4A6A-A610-85E2DAC37D91}" type="datetimeFigureOut">
               <a:rPr lang="zh-CN" altLang="en-US" smtClean="0"/>
-              <a:t>2024/05/08</a:t>
+              <a:t>2024/05/11</a:t>
             </a:fld>
             <a:endParaRPr lang="zh-CN" altLang="en-US"/>
           </a:p>
@@ -1398,7 +1405,7 @@
           <a:p>
             <a:fld id="{E62BEFD4-20EB-4A6A-A610-85E2DAC37D91}" type="datetimeFigureOut">
               <a:rPr lang="zh-CN" altLang="en-US" smtClean="0"/>
-              <a:t>2024/05/08</a:t>
+              <a:t>2024/05/11</a:t>
             </a:fld>
             <a:endParaRPr lang="zh-CN" altLang="en-US"/>
           </a:p>
@@ -1810,7 +1817,7 @@
           <a:p>
             <a:fld id="{E62BEFD4-20EB-4A6A-A610-85E2DAC37D91}" type="datetimeFigureOut">
               <a:rPr lang="zh-CN" altLang="en-US" smtClean="0"/>
-              <a:t>2024/05/08</a:t>
+              <a:t>2024/05/11</a:t>
             </a:fld>
             <a:endParaRPr lang="zh-CN" altLang="en-US"/>
           </a:p>
@@ -1951,7 +1958,7 @@
           <a:p>
             <a:fld id="{E62BEFD4-20EB-4A6A-A610-85E2DAC37D91}" type="datetimeFigureOut">
               <a:rPr lang="zh-CN" altLang="en-US" smtClean="0"/>
-              <a:t>2024/05/08</a:t>
+              <a:t>2024/05/11</a:t>
             </a:fld>
             <a:endParaRPr lang="zh-CN" altLang="en-US"/>
           </a:p>
@@ -2064,7 +2071,7 @@
           <a:p>
             <a:fld id="{E62BEFD4-20EB-4A6A-A610-85E2DAC37D91}" type="datetimeFigureOut">
               <a:rPr lang="zh-CN" altLang="en-US" smtClean="0"/>
-              <a:t>2024/05/08</a:t>
+              <a:t>2024/05/11</a:t>
             </a:fld>
             <a:endParaRPr lang="zh-CN" altLang="en-US"/>
           </a:p>
@@ -2375,7 +2382,7 @@
           <a:p>
             <a:fld id="{E62BEFD4-20EB-4A6A-A610-85E2DAC37D91}" type="datetimeFigureOut">
               <a:rPr lang="zh-CN" altLang="en-US" smtClean="0"/>
-              <a:t>2024/05/08</a:t>
+              <a:t>2024/05/11</a:t>
             </a:fld>
             <a:endParaRPr lang="zh-CN" altLang="en-US"/>
           </a:p>
@@ -2663,7 +2670,7 @@
           <a:p>
             <a:fld id="{E62BEFD4-20EB-4A6A-A610-85E2DAC37D91}" type="datetimeFigureOut">
               <a:rPr lang="zh-CN" altLang="en-US" smtClean="0"/>
-              <a:t>2024/05/08</a:t>
+              <a:t>2024/05/11</a:t>
             </a:fld>
             <a:endParaRPr lang="zh-CN" altLang="en-US"/>
           </a:p>
@@ -2904,7 +2911,7 @@
           <a:p>
             <a:fld id="{E62BEFD4-20EB-4A6A-A610-85E2DAC37D91}" type="datetimeFigureOut">
               <a:rPr lang="zh-CN" altLang="en-US" smtClean="0"/>
-              <a:t>2024/05/08</a:t>
+              <a:t>2024/05/11</a:t>
             </a:fld>
             <a:endParaRPr lang="zh-CN" altLang="en-US"/>
           </a:p>
@@ -3484,6 +3491,2510 @@
 </p:sld>
 </file>
 
+<file path=ppt/slides/slide2.xml><?xml version="1.0" encoding="utf-8"?>
+<p:sld xmlns:a="http://schemas.openxmlformats.org/drawingml/2006/main" xmlns:r="http://schemas.openxmlformats.org/officeDocument/2006/relationships" xmlns:p="http://schemas.openxmlformats.org/presentationml/2006/main">
+  <p:cSld>
+    <p:spTree>
+      <p:nvGrpSpPr>
+        <p:cNvPr id="1" name=""/>
+        <p:cNvGrpSpPr/>
+        <p:nvPr/>
+      </p:nvGrpSpPr>
+      <p:grpSpPr>
+        <a:xfrm>
+          <a:off x="0" y="0"/>
+          <a:ext cx="0" cy="0"/>
+          <a:chOff x="0" y="0"/>
+          <a:chExt cx="0" cy="0"/>
+        </a:xfrm>
+      </p:grpSpPr>
+      <p:sp>
+        <p:nvSpPr>
+          <p:cNvPr id="4" name="矩形 3">
+            <a:extLst>
+              <a:ext uri="{FF2B5EF4-FFF2-40B4-BE49-F238E27FC236}">
+                <a16:creationId xmlns:a16="http://schemas.microsoft.com/office/drawing/2014/main" id="{45F84D47-78EF-43D8-9555-A273B9A9D0E7}"/>
+              </a:ext>
+            </a:extLst>
+          </p:cNvPr>
+          <p:cNvSpPr/>
+          <p:nvPr/>
+        </p:nvSpPr>
+        <p:spPr>
+          <a:xfrm>
+            <a:off x="1012054" y="1562470"/>
+            <a:ext cx="4314548" cy="3773010"/>
+          </a:xfrm>
+          <a:custGeom>
+            <a:avLst/>
+            <a:gdLst>
+              <a:gd name="connsiteX0" fmla="*/ 0 w 4314548"/>
+              <a:gd name="connsiteY0" fmla="*/ 0 h 3773010"/>
+              <a:gd name="connsiteX1" fmla="*/ 659509 w 4314548"/>
+              <a:gd name="connsiteY1" fmla="*/ 0 h 3773010"/>
+              <a:gd name="connsiteX2" fmla="*/ 1275873 w 4314548"/>
+              <a:gd name="connsiteY2" fmla="*/ 0 h 3773010"/>
+              <a:gd name="connsiteX3" fmla="*/ 1805947 w 4314548"/>
+              <a:gd name="connsiteY3" fmla="*/ 0 h 3773010"/>
+              <a:gd name="connsiteX4" fmla="*/ 2508601 w 4314548"/>
+              <a:gd name="connsiteY4" fmla="*/ 0 h 3773010"/>
+              <a:gd name="connsiteX5" fmla="*/ 3211256 w 4314548"/>
+              <a:gd name="connsiteY5" fmla="*/ 0 h 3773010"/>
+              <a:gd name="connsiteX6" fmla="*/ 3698184 w 4314548"/>
+              <a:gd name="connsiteY6" fmla="*/ 0 h 3773010"/>
+              <a:gd name="connsiteX7" fmla="*/ 4314548 w 4314548"/>
+              <a:gd name="connsiteY7" fmla="*/ 0 h 3773010"/>
+              <a:gd name="connsiteX8" fmla="*/ 4314548 w 4314548"/>
+              <a:gd name="connsiteY8" fmla="*/ 515645 h 3773010"/>
+              <a:gd name="connsiteX9" fmla="*/ 4314548 w 4314548"/>
+              <a:gd name="connsiteY9" fmla="*/ 1069020 h 3773010"/>
+              <a:gd name="connsiteX10" fmla="*/ 4314548 w 4314548"/>
+              <a:gd name="connsiteY10" fmla="*/ 1622394 h 3773010"/>
+              <a:gd name="connsiteX11" fmla="*/ 4314548 w 4314548"/>
+              <a:gd name="connsiteY11" fmla="*/ 2251229 h 3773010"/>
+              <a:gd name="connsiteX12" fmla="*/ 4314548 w 4314548"/>
+              <a:gd name="connsiteY12" fmla="*/ 2842334 h 3773010"/>
+              <a:gd name="connsiteX13" fmla="*/ 4314548 w 4314548"/>
+              <a:gd name="connsiteY13" fmla="*/ 3773010 h 3773010"/>
+              <a:gd name="connsiteX14" fmla="*/ 3827620 w 4314548"/>
+              <a:gd name="connsiteY14" fmla="*/ 3773010 h 3773010"/>
+              <a:gd name="connsiteX15" fmla="*/ 3211256 w 4314548"/>
+              <a:gd name="connsiteY15" fmla="*/ 3773010 h 3773010"/>
+              <a:gd name="connsiteX16" fmla="*/ 2551747 w 4314548"/>
+              <a:gd name="connsiteY16" fmla="*/ 3773010 h 3773010"/>
+              <a:gd name="connsiteX17" fmla="*/ 1892237 w 4314548"/>
+              <a:gd name="connsiteY17" fmla="*/ 3773010 h 3773010"/>
+              <a:gd name="connsiteX18" fmla="*/ 1275873 w 4314548"/>
+              <a:gd name="connsiteY18" fmla="*/ 3773010 h 3773010"/>
+              <a:gd name="connsiteX19" fmla="*/ 659509 w 4314548"/>
+              <a:gd name="connsiteY19" fmla="*/ 3773010 h 3773010"/>
+              <a:gd name="connsiteX20" fmla="*/ 0 w 4314548"/>
+              <a:gd name="connsiteY20" fmla="*/ 3773010 h 3773010"/>
+              <a:gd name="connsiteX21" fmla="*/ 0 w 4314548"/>
+              <a:gd name="connsiteY21" fmla="*/ 3219635 h 3773010"/>
+              <a:gd name="connsiteX22" fmla="*/ 0 w 4314548"/>
+              <a:gd name="connsiteY22" fmla="*/ 2703991 h 3773010"/>
+              <a:gd name="connsiteX23" fmla="*/ 0 w 4314548"/>
+              <a:gd name="connsiteY23" fmla="*/ 2075156 h 3773010"/>
+              <a:gd name="connsiteX24" fmla="*/ 0 w 4314548"/>
+              <a:gd name="connsiteY24" fmla="*/ 1559511 h 3773010"/>
+              <a:gd name="connsiteX25" fmla="*/ 0 w 4314548"/>
+              <a:gd name="connsiteY25" fmla="*/ 930676 h 3773010"/>
+              <a:gd name="connsiteX26" fmla="*/ 0 w 4314548"/>
+              <a:gd name="connsiteY26" fmla="*/ 0 h 3773010"/>
+            </a:gdLst>
+            <a:ahLst/>
+            <a:cxnLst>
+              <a:cxn ang="0">
+                <a:pos x="connsiteX0" y="connsiteY0"/>
+              </a:cxn>
+              <a:cxn ang="0">
+                <a:pos x="connsiteX1" y="connsiteY1"/>
+              </a:cxn>
+              <a:cxn ang="0">
+                <a:pos x="connsiteX2" y="connsiteY2"/>
+              </a:cxn>
+              <a:cxn ang="0">
+                <a:pos x="connsiteX3" y="connsiteY3"/>
+              </a:cxn>
+              <a:cxn ang="0">
+                <a:pos x="connsiteX4" y="connsiteY4"/>
+              </a:cxn>
+              <a:cxn ang="0">
+                <a:pos x="connsiteX5" y="connsiteY5"/>
+              </a:cxn>
+              <a:cxn ang="0">
+                <a:pos x="connsiteX6" y="connsiteY6"/>
+              </a:cxn>
+              <a:cxn ang="0">
+                <a:pos x="connsiteX7" y="connsiteY7"/>
+              </a:cxn>
+              <a:cxn ang="0">
+                <a:pos x="connsiteX8" y="connsiteY8"/>
+              </a:cxn>
+              <a:cxn ang="0">
+                <a:pos x="connsiteX9" y="connsiteY9"/>
+              </a:cxn>
+              <a:cxn ang="0">
+                <a:pos x="connsiteX10" y="connsiteY10"/>
+              </a:cxn>
+              <a:cxn ang="0">
+                <a:pos x="connsiteX11" y="connsiteY11"/>
+              </a:cxn>
+              <a:cxn ang="0">
+                <a:pos x="connsiteX12" y="connsiteY12"/>
+              </a:cxn>
+              <a:cxn ang="0">
+                <a:pos x="connsiteX13" y="connsiteY13"/>
+              </a:cxn>
+              <a:cxn ang="0">
+                <a:pos x="connsiteX14" y="connsiteY14"/>
+              </a:cxn>
+              <a:cxn ang="0">
+                <a:pos x="connsiteX15" y="connsiteY15"/>
+              </a:cxn>
+              <a:cxn ang="0">
+                <a:pos x="connsiteX16" y="connsiteY16"/>
+              </a:cxn>
+              <a:cxn ang="0">
+                <a:pos x="connsiteX17" y="connsiteY17"/>
+              </a:cxn>
+              <a:cxn ang="0">
+                <a:pos x="connsiteX18" y="connsiteY18"/>
+              </a:cxn>
+              <a:cxn ang="0">
+                <a:pos x="connsiteX19" y="connsiteY19"/>
+              </a:cxn>
+              <a:cxn ang="0">
+                <a:pos x="connsiteX20" y="connsiteY20"/>
+              </a:cxn>
+              <a:cxn ang="0">
+                <a:pos x="connsiteX21" y="connsiteY21"/>
+              </a:cxn>
+              <a:cxn ang="0">
+                <a:pos x="connsiteX22" y="connsiteY22"/>
+              </a:cxn>
+              <a:cxn ang="0">
+                <a:pos x="connsiteX23" y="connsiteY23"/>
+              </a:cxn>
+              <a:cxn ang="0">
+                <a:pos x="connsiteX24" y="connsiteY24"/>
+              </a:cxn>
+              <a:cxn ang="0">
+                <a:pos x="connsiteX25" y="connsiteY25"/>
+              </a:cxn>
+              <a:cxn ang="0">
+                <a:pos x="connsiteX26" y="connsiteY26"/>
+              </a:cxn>
+            </a:cxnLst>
+            <a:rect l="l" t="t" r="r" b="b"/>
+            <a:pathLst>
+              <a:path w="4314548" h="3773010" extrusionOk="0">
+                <a:moveTo>
+                  <a:pt x="0" y="0"/>
+                </a:moveTo>
+                <a:cubicBezTo>
+                  <a:pt x="273698" y="-32216"/>
+                  <a:pt x="480121" y="-29856"/>
+                  <a:pt x="659509" y="0"/>
+                </a:cubicBezTo>
+                <a:cubicBezTo>
+                  <a:pt x="838897" y="29856"/>
+                  <a:pt x="1106709" y="29668"/>
+                  <a:pt x="1275873" y="0"/>
+                </a:cubicBezTo>
+                <a:cubicBezTo>
+                  <a:pt x="1445037" y="-29668"/>
+                  <a:pt x="1695033" y="-14488"/>
+                  <a:pt x="1805947" y="0"/>
+                </a:cubicBezTo>
+                <a:cubicBezTo>
+                  <a:pt x="1916861" y="14488"/>
+                  <a:pt x="2265791" y="24938"/>
+                  <a:pt x="2508601" y="0"/>
+                </a:cubicBezTo>
+                <a:cubicBezTo>
+                  <a:pt x="2751411" y="-24938"/>
+                  <a:pt x="2887690" y="-32796"/>
+                  <a:pt x="3211256" y="0"/>
+                </a:cubicBezTo>
+                <a:cubicBezTo>
+                  <a:pt x="3534822" y="32796"/>
+                  <a:pt x="3544197" y="14831"/>
+                  <a:pt x="3698184" y="0"/>
+                </a:cubicBezTo>
+                <a:cubicBezTo>
+                  <a:pt x="3852171" y="-14831"/>
+                  <a:pt x="4022849" y="1264"/>
+                  <a:pt x="4314548" y="0"/>
+                </a:cubicBezTo>
+                <a:cubicBezTo>
+                  <a:pt x="4317147" y="195434"/>
+                  <a:pt x="4298008" y="382456"/>
+                  <a:pt x="4314548" y="515645"/>
+                </a:cubicBezTo>
+                <a:cubicBezTo>
+                  <a:pt x="4331088" y="648834"/>
+                  <a:pt x="4332261" y="805525"/>
+                  <a:pt x="4314548" y="1069020"/>
+                </a:cubicBezTo>
+                <a:cubicBezTo>
+                  <a:pt x="4296835" y="1332516"/>
+                  <a:pt x="4333351" y="1430376"/>
+                  <a:pt x="4314548" y="1622394"/>
+                </a:cubicBezTo>
+                <a:cubicBezTo>
+                  <a:pt x="4295745" y="1814412"/>
+                  <a:pt x="4322292" y="2016575"/>
+                  <a:pt x="4314548" y="2251229"/>
+                </a:cubicBezTo>
+                <a:cubicBezTo>
+                  <a:pt x="4306804" y="2485884"/>
+                  <a:pt x="4313134" y="2672252"/>
+                  <a:pt x="4314548" y="2842334"/>
+                </a:cubicBezTo>
+                <a:cubicBezTo>
+                  <a:pt x="4315962" y="3012417"/>
+                  <a:pt x="4283650" y="3491405"/>
+                  <a:pt x="4314548" y="3773010"/>
+                </a:cubicBezTo>
+                <a:cubicBezTo>
+                  <a:pt x="4195453" y="3754301"/>
+                  <a:pt x="3981241" y="3769131"/>
+                  <a:pt x="3827620" y="3773010"/>
+                </a:cubicBezTo>
+                <a:cubicBezTo>
+                  <a:pt x="3673999" y="3776889"/>
+                  <a:pt x="3425019" y="3754786"/>
+                  <a:pt x="3211256" y="3773010"/>
+                </a:cubicBezTo>
+                <a:cubicBezTo>
+                  <a:pt x="2997493" y="3791234"/>
+                  <a:pt x="2730775" y="3782151"/>
+                  <a:pt x="2551747" y="3773010"/>
+                </a:cubicBezTo>
+                <a:cubicBezTo>
+                  <a:pt x="2372719" y="3763869"/>
+                  <a:pt x="2056884" y="3752534"/>
+                  <a:pt x="1892237" y="3773010"/>
+                </a:cubicBezTo>
+                <a:cubicBezTo>
+                  <a:pt x="1727590" y="3793487"/>
+                  <a:pt x="1547589" y="3742785"/>
+                  <a:pt x="1275873" y="3773010"/>
+                </a:cubicBezTo>
+                <a:cubicBezTo>
+                  <a:pt x="1004157" y="3803235"/>
+                  <a:pt x="960500" y="3771241"/>
+                  <a:pt x="659509" y="3773010"/>
+                </a:cubicBezTo>
+                <a:cubicBezTo>
+                  <a:pt x="358518" y="3774779"/>
+                  <a:pt x="313407" y="3781228"/>
+                  <a:pt x="0" y="3773010"/>
+                </a:cubicBezTo>
+                <a:cubicBezTo>
+                  <a:pt x="27020" y="3592367"/>
+                  <a:pt x="-26155" y="3406772"/>
+                  <a:pt x="0" y="3219635"/>
+                </a:cubicBezTo>
+                <a:cubicBezTo>
+                  <a:pt x="26155" y="3032498"/>
+                  <a:pt x="3696" y="2910662"/>
+                  <a:pt x="0" y="2703991"/>
+                </a:cubicBezTo>
+                <a:cubicBezTo>
+                  <a:pt x="-3696" y="2497320"/>
+                  <a:pt x="22217" y="2290142"/>
+                  <a:pt x="0" y="2075156"/>
+                </a:cubicBezTo>
+                <a:cubicBezTo>
+                  <a:pt x="-22217" y="1860171"/>
+                  <a:pt x="18659" y="1744203"/>
+                  <a:pt x="0" y="1559511"/>
+                </a:cubicBezTo>
+                <a:cubicBezTo>
+                  <a:pt x="-18659" y="1374820"/>
+                  <a:pt x="15235" y="1164934"/>
+                  <a:pt x="0" y="930676"/>
+                </a:cubicBezTo>
+                <a:cubicBezTo>
+                  <a:pt x="-15235" y="696418"/>
+                  <a:pt x="33201" y="427878"/>
+                  <a:pt x="0" y="0"/>
+                </a:cubicBezTo>
+                <a:close/>
+              </a:path>
+            </a:pathLst>
+          </a:custGeom>
+          <a:noFill/>
+          <a:ln w="28575">
+            <a:solidFill>
+              <a:schemeClr val="tx1">
+                <a:lumMod val="50000"/>
+                <a:lumOff val="50000"/>
+              </a:schemeClr>
+            </a:solidFill>
+            <a:extLst>
+              <a:ext uri="{C807C97D-BFC1-408E-A445-0C87EB9F89A2}">
+                <ask:lineSketchStyleProps xmlns:ask="http://schemas.microsoft.com/office/drawing/2018/sketchyshapes" sd="3154728892">
+                  <a:prstGeom prst="rect">
+                    <a:avLst/>
+                  </a:prstGeom>
+                  <ask:type>
+                    <ask:lineSketchFreehand/>
+                  </ask:type>
+                </ask:lineSketchStyleProps>
+              </a:ext>
+            </a:extLst>
+          </a:ln>
+        </p:spPr>
+        <p:style>
+          <a:lnRef idx="2">
+            <a:schemeClr val="accent1">
+              <a:shade val="50000"/>
+            </a:schemeClr>
+          </a:lnRef>
+          <a:fillRef idx="1">
+            <a:schemeClr val="accent1"/>
+          </a:fillRef>
+          <a:effectRef idx="0">
+            <a:schemeClr val="accent1"/>
+          </a:effectRef>
+          <a:fontRef idx="minor">
+            <a:schemeClr val="lt1"/>
+          </a:fontRef>
+        </p:style>
+        <p:txBody>
+          <a:bodyPr rtlCol="0" anchor="ctr"/>
+          <a:lstStyle/>
+          <a:p>
+            <a:pPr algn="ctr"/>
+            <a:endParaRPr lang="zh-CN" altLang="en-US"/>
+          </a:p>
+        </p:txBody>
+      </p:sp>
+      <p:sp>
+        <p:nvSpPr>
+          <p:cNvPr id="5" name="矩形 4">
+            <a:extLst>
+              <a:ext uri="{FF2B5EF4-FFF2-40B4-BE49-F238E27FC236}">
+                <a16:creationId xmlns:a16="http://schemas.microsoft.com/office/drawing/2014/main" id="{63F7D2A0-A392-4BD8-B2C8-642D53DBC6D8}"/>
+              </a:ext>
+            </a:extLst>
+          </p:cNvPr>
+          <p:cNvSpPr/>
+          <p:nvPr/>
+        </p:nvSpPr>
+        <p:spPr>
+          <a:xfrm>
+            <a:off x="5782322" y="1562470"/>
+            <a:ext cx="4314548" cy="3773010"/>
+          </a:xfrm>
+          <a:custGeom>
+            <a:avLst/>
+            <a:gdLst>
+              <a:gd name="connsiteX0" fmla="*/ 0 w 4314548"/>
+              <a:gd name="connsiteY0" fmla="*/ 0 h 3773010"/>
+              <a:gd name="connsiteX1" fmla="*/ 659509 w 4314548"/>
+              <a:gd name="connsiteY1" fmla="*/ 0 h 3773010"/>
+              <a:gd name="connsiteX2" fmla="*/ 1275873 w 4314548"/>
+              <a:gd name="connsiteY2" fmla="*/ 0 h 3773010"/>
+              <a:gd name="connsiteX3" fmla="*/ 1805947 w 4314548"/>
+              <a:gd name="connsiteY3" fmla="*/ 0 h 3773010"/>
+              <a:gd name="connsiteX4" fmla="*/ 2508601 w 4314548"/>
+              <a:gd name="connsiteY4" fmla="*/ 0 h 3773010"/>
+              <a:gd name="connsiteX5" fmla="*/ 3211256 w 4314548"/>
+              <a:gd name="connsiteY5" fmla="*/ 0 h 3773010"/>
+              <a:gd name="connsiteX6" fmla="*/ 3698184 w 4314548"/>
+              <a:gd name="connsiteY6" fmla="*/ 0 h 3773010"/>
+              <a:gd name="connsiteX7" fmla="*/ 4314548 w 4314548"/>
+              <a:gd name="connsiteY7" fmla="*/ 0 h 3773010"/>
+              <a:gd name="connsiteX8" fmla="*/ 4314548 w 4314548"/>
+              <a:gd name="connsiteY8" fmla="*/ 515645 h 3773010"/>
+              <a:gd name="connsiteX9" fmla="*/ 4314548 w 4314548"/>
+              <a:gd name="connsiteY9" fmla="*/ 1069020 h 3773010"/>
+              <a:gd name="connsiteX10" fmla="*/ 4314548 w 4314548"/>
+              <a:gd name="connsiteY10" fmla="*/ 1622394 h 3773010"/>
+              <a:gd name="connsiteX11" fmla="*/ 4314548 w 4314548"/>
+              <a:gd name="connsiteY11" fmla="*/ 2251229 h 3773010"/>
+              <a:gd name="connsiteX12" fmla="*/ 4314548 w 4314548"/>
+              <a:gd name="connsiteY12" fmla="*/ 2842334 h 3773010"/>
+              <a:gd name="connsiteX13" fmla="*/ 4314548 w 4314548"/>
+              <a:gd name="connsiteY13" fmla="*/ 3773010 h 3773010"/>
+              <a:gd name="connsiteX14" fmla="*/ 3827620 w 4314548"/>
+              <a:gd name="connsiteY14" fmla="*/ 3773010 h 3773010"/>
+              <a:gd name="connsiteX15" fmla="*/ 3211256 w 4314548"/>
+              <a:gd name="connsiteY15" fmla="*/ 3773010 h 3773010"/>
+              <a:gd name="connsiteX16" fmla="*/ 2551747 w 4314548"/>
+              <a:gd name="connsiteY16" fmla="*/ 3773010 h 3773010"/>
+              <a:gd name="connsiteX17" fmla="*/ 1892237 w 4314548"/>
+              <a:gd name="connsiteY17" fmla="*/ 3773010 h 3773010"/>
+              <a:gd name="connsiteX18" fmla="*/ 1275873 w 4314548"/>
+              <a:gd name="connsiteY18" fmla="*/ 3773010 h 3773010"/>
+              <a:gd name="connsiteX19" fmla="*/ 659509 w 4314548"/>
+              <a:gd name="connsiteY19" fmla="*/ 3773010 h 3773010"/>
+              <a:gd name="connsiteX20" fmla="*/ 0 w 4314548"/>
+              <a:gd name="connsiteY20" fmla="*/ 3773010 h 3773010"/>
+              <a:gd name="connsiteX21" fmla="*/ 0 w 4314548"/>
+              <a:gd name="connsiteY21" fmla="*/ 3219635 h 3773010"/>
+              <a:gd name="connsiteX22" fmla="*/ 0 w 4314548"/>
+              <a:gd name="connsiteY22" fmla="*/ 2703991 h 3773010"/>
+              <a:gd name="connsiteX23" fmla="*/ 0 w 4314548"/>
+              <a:gd name="connsiteY23" fmla="*/ 2075156 h 3773010"/>
+              <a:gd name="connsiteX24" fmla="*/ 0 w 4314548"/>
+              <a:gd name="connsiteY24" fmla="*/ 1559511 h 3773010"/>
+              <a:gd name="connsiteX25" fmla="*/ 0 w 4314548"/>
+              <a:gd name="connsiteY25" fmla="*/ 930676 h 3773010"/>
+              <a:gd name="connsiteX26" fmla="*/ 0 w 4314548"/>
+              <a:gd name="connsiteY26" fmla="*/ 0 h 3773010"/>
+            </a:gdLst>
+            <a:ahLst/>
+            <a:cxnLst>
+              <a:cxn ang="0">
+                <a:pos x="connsiteX0" y="connsiteY0"/>
+              </a:cxn>
+              <a:cxn ang="0">
+                <a:pos x="connsiteX1" y="connsiteY1"/>
+              </a:cxn>
+              <a:cxn ang="0">
+                <a:pos x="connsiteX2" y="connsiteY2"/>
+              </a:cxn>
+              <a:cxn ang="0">
+                <a:pos x="connsiteX3" y="connsiteY3"/>
+              </a:cxn>
+              <a:cxn ang="0">
+                <a:pos x="connsiteX4" y="connsiteY4"/>
+              </a:cxn>
+              <a:cxn ang="0">
+                <a:pos x="connsiteX5" y="connsiteY5"/>
+              </a:cxn>
+              <a:cxn ang="0">
+                <a:pos x="connsiteX6" y="connsiteY6"/>
+              </a:cxn>
+              <a:cxn ang="0">
+                <a:pos x="connsiteX7" y="connsiteY7"/>
+              </a:cxn>
+              <a:cxn ang="0">
+                <a:pos x="connsiteX8" y="connsiteY8"/>
+              </a:cxn>
+              <a:cxn ang="0">
+                <a:pos x="connsiteX9" y="connsiteY9"/>
+              </a:cxn>
+              <a:cxn ang="0">
+                <a:pos x="connsiteX10" y="connsiteY10"/>
+              </a:cxn>
+              <a:cxn ang="0">
+                <a:pos x="connsiteX11" y="connsiteY11"/>
+              </a:cxn>
+              <a:cxn ang="0">
+                <a:pos x="connsiteX12" y="connsiteY12"/>
+              </a:cxn>
+              <a:cxn ang="0">
+                <a:pos x="connsiteX13" y="connsiteY13"/>
+              </a:cxn>
+              <a:cxn ang="0">
+                <a:pos x="connsiteX14" y="connsiteY14"/>
+              </a:cxn>
+              <a:cxn ang="0">
+                <a:pos x="connsiteX15" y="connsiteY15"/>
+              </a:cxn>
+              <a:cxn ang="0">
+                <a:pos x="connsiteX16" y="connsiteY16"/>
+              </a:cxn>
+              <a:cxn ang="0">
+                <a:pos x="connsiteX17" y="connsiteY17"/>
+              </a:cxn>
+              <a:cxn ang="0">
+                <a:pos x="connsiteX18" y="connsiteY18"/>
+              </a:cxn>
+              <a:cxn ang="0">
+                <a:pos x="connsiteX19" y="connsiteY19"/>
+              </a:cxn>
+              <a:cxn ang="0">
+                <a:pos x="connsiteX20" y="connsiteY20"/>
+              </a:cxn>
+              <a:cxn ang="0">
+                <a:pos x="connsiteX21" y="connsiteY21"/>
+              </a:cxn>
+              <a:cxn ang="0">
+                <a:pos x="connsiteX22" y="connsiteY22"/>
+              </a:cxn>
+              <a:cxn ang="0">
+                <a:pos x="connsiteX23" y="connsiteY23"/>
+              </a:cxn>
+              <a:cxn ang="0">
+                <a:pos x="connsiteX24" y="connsiteY24"/>
+              </a:cxn>
+              <a:cxn ang="0">
+                <a:pos x="connsiteX25" y="connsiteY25"/>
+              </a:cxn>
+              <a:cxn ang="0">
+                <a:pos x="connsiteX26" y="connsiteY26"/>
+              </a:cxn>
+            </a:cxnLst>
+            <a:rect l="l" t="t" r="r" b="b"/>
+            <a:pathLst>
+              <a:path w="4314548" h="3773010" extrusionOk="0">
+                <a:moveTo>
+                  <a:pt x="0" y="0"/>
+                </a:moveTo>
+                <a:cubicBezTo>
+                  <a:pt x="273698" y="-32216"/>
+                  <a:pt x="480121" y="-29856"/>
+                  <a:pt x="659509" y="0"/>
+                </a:cubicBezTo>
+                <a:cubicBezTo>
+                  <a:pt x="838897" y="29856"/>
+                  <a:pt x="1106709" y="29668"/>
+                  <a:pt x="1275873" y="0"/>
+                </a:cubicBezTo>
+                <a:cubicBezTo>
+                  <a:pt x="1445037" y="-29668"/>
+                  <a:pt x="1695033" y="-14488"/>
+                  <a:pt x="1805947" y="0"/>
+                </a:cubicBezTo>
+                <a:cubicBezTo>
+                  <a:pt x="1916861" y="14488"/>
+                  <a:pt x="2265791" y="24938"/>
+                  <a:pt x="2508601" y="0"/>
+                </a:cubicBezTo>
+                <a:cubicBezTo>
+                  <a:pt x="2751411" y="-24938"/>
+                  <a:pt x="2887690" y="-32796"/>
+                  <a:pt x="3211256" y="0"/>
+                </a:cubicBezTo>
+                <a:cubicBezTo>
+                  <a:pt x="3534822" y="32796"/>
+                  <a:pt x="3544197" y="14831"/>
+                  <a:pt x="3698184" y="0"/>
+                </a:cubicBezTo>
+                <a:cubicBezTo>
+                  <a:pt x="3852171" y="-14831"/>
+                  <a:pt x="4022849" y="1264"/>
+                  <a:pt x="4314548" y="0"/>
+                </a:cubicBezTo>
+                <a:cubicBezTo>
+                  <a:pt x="4317147" y="195434"/>
+                  <a:pt x="4298008" y="382456"/>
+                  <a:pt x="4314548" y="515645"/>
+                </a:cubicBezTo>
+                <a:cubicBezTo>
+                  <a:pt x="4331088" y="648834"/>
+                  <a:pt x="4332261" y="805525"/>
+                  <a:pt x="4314548" y="1069020"/>
+                </a:cubicBezTo>
+                <a:cubicBezTo>
+                  <a:pt x="4296835" y="1332516"/>
+                  <a:pt x="4333351" y="1430376"/>
+                  <a:pt x="4314548" y="1622394"/>
+                </a:cubicBezTo>
+                <a:cubicBezTo>
+                  <a:pt x="4295745" y="1814412"/>
+                  <a:pt x="4322292" y="2016575"/>
+                  <a:pt x="4314548" y="2251229"/>
+                </a:cubicBezTo>
+                <a:cubicBezTo>
+                  <a:pt x="4306804" y="2485884"/>
+                  <a:pt x="4313134" y="2672252"/>
+                  <a:pt x="4314548" y="2842334"/>
+                </a:cubicBezTo>
+                <a:cubicBezTo>
+                  <a:pt x="4315962" y="3012417"/>
+                  <a:pt x="4283650" y="3491405"/>
+                  <a:pt x="4314548" y="3773010"/>
+                </a:cubicBezTo>
+                <a:cubicBezTo>
+                  <a:pt x="4195453" y="3754301"/>
+                  <a:pt x="3981241" y="3769131"/>
+                  <a:pt x="3827620" y="3773010"/>
+                </a:cubicBezTo>
+                <a:cubicBezTo>
+                  <a:pt x="3673999" y="3776889"/>
+                  <a:pt x="3425019" y="3754786"/>
+                  <a:pt x="3211256" y="3773010"/>
+                </a:cubicBezTo>
+                <a:cubicBezTo>
+                  <a:pt x="2997493" y="3791234"/>
+                  <a:pt x="2730775" y="3782151"/>
+                  <a:pt x="2551747" y="3773010"/>
+                </a:cubicBezTo>
+                <a:cubicBezTo>
+                  <a:pt x="2372719" y="3763869"/>
+                  <a:pt x="2056884" y="3752534"/>
+                  <a:pt x="1892237" y="3773010"/>
+                </a:cubicBezTo>
+                <a:cubicBezTo>
+                  <a:pt x="1727590" y="3793487"/>
+                  <a:pt x="1547589" y="3742785"/>
+                  <a:pt x="1275873" y="3773010"/>
+                </a:cubicBezTo>
+                <a:cubicBezTo>
+                  <a:pt x="1004157" y="3803235"/>
+                  <a:pt x="960500" y="3771241"/>
+                  <a:pt x="659509" y="3773010"/>
+                </a:cubicBezTo>
+                <a:cubicBezTo>
+                  <a:pt x="358518" y="3774779"/>
+                  <a:pt x="313407" y="3781228"/>
+                  <a:pt x="0" y="3773010"/>
+                </a:cubicBezTo>
+                <a:cubicBezTo>
+                  <a:pt x="27020" y="3592367"/>
+                  <a:pt x="-26155" y="3406772"/>
+                  <a:pt x="0" y="3219635"/>
+                </a:cubicBezTo>
+                <a:cubicBezTo>
+                  <a:pt x="26155" y="3032498"/>
+                  <a:pt x="3696" y="2910662"/>
+                  <a:pt x="0" y="2703991"/>
+                </a:cubicBezTo>
+                <a:cubicBezTo>
+                  <a:pt x="-3696" y="2497320"/>
+                  <a:pt x="22217" y="2290142"/>
+                  <a:pt x="0" y="2075156"/>
+                </a:cubicBezTo>
+                <a:cubicBezTo>
+                  <a:pt x="-22217" y="1860171"/>
+                  <a:pt x="18659" y="1744203"/>
+                  <a:pt x="0" y="1559511"/>
+                </a:cubicBezTo>
+                <a:cubicBezTo>
+                  <a:pt x="-18659" y="1374820"/>
+                  <a:pt x="15235" y="1164934"/>
+                  <a:pt x="0" y="930676"/>
+                </a:cubicBezTo>
+                <a:cubicBezTo>
+                  <a:pt x="-15235" y="696418"/>
+                  <a:pt x="33201" y="427878"/>
+                  <a:pt x="0" y="0"/>
+                </a:cubicBezTo>
+                <a:close/>
+              </a:path>
+            </a:pathLst>
+          </a:custGeom>
+          <a:noFill/>
+          <a:ln w="28575">
+            <a:solidFill>
+              <a:schemeClr val="tx1">
+                <a:lumMod val="50000"/>
+                <a:lumOff val="50000"/>
+              </a:schemeClr>
+            </a:solidFill>
+            <a:extLst>
+              <a:ext uri="{C807C97D-BFC1-408E-A445-0C87EB9F89A2}">
+                <ask:lineSketchStyleProps xmlns:ask="http://schemas.microsoft.com/office/drawing/2018/sketchyshapes" sd="3154728892">
+                  <a:prstGeom prst="rect">
+                    <a:avLst/>
+                  </a:prstGeom>
+                  <ask:type>
+                    <ask:lineSketchFreehand/>
+                  </ask:type>
+                </ask:lineSketchStyleProps>
+              </a:ext>
+            </a:extLst>
+          </a:ln>
+        </p:spPr>
+        <p:style>
+          <a:lnRef idx="2">
+            <a:schemeClr val="accent1">
+              <a:shade val="50000"/>
+            </a:schemeClr>
+          </a:lnRef>
+          <a:fillRef idx="1">
+            <a:schemeClr val="accent1"/>
+          </a:fillRef>
+          <a:effectRef idx="0">
+            <a:schemeClr val="accent1"/>
+          </a:effectRef>
+          <a:fontRef idx="minor">
+            <a:schemeClr val="lt1"/>
+          </a:fontRef>
+        </p:style>
+        <p:txBody>
+          <a:bodyPr rtlCol="0" anchor="ctr"/>
+          <a:lstStyle/>
+          <a:p>
+            <a:pPr algn="ctr"/>
+            <a:endParaRPr lang="zh-CN" altLang="en-US"/>
+          </a:p>
+        </p:txBody>
+      </p:sp>
+      <p:sp>
+        <p:nvSpPr>
+          <p:cNvPr id="7" name="矩形 6">
+            <a:extLst>
+              <a:ext uri="{FF2B5EF4-FFF2-40B4-BE49-F238E27FC236}">
+                <a16:creationId xmlns:a16="http://schemas.microsoft.com/office/drawing/2014/main" id="{EF31E532-79CA-4736-8C9E-C0AF49B052CE}"/>
+              </a:ext>
+            </a:extLst>
+          </p:cNvPr>
+          <p:cNvSpPr/>
+          <p:nvPr/>
+        </p:nvSpPr>
+        <p:spPr>
+          <a:xfrm>
+            <a:off x="1189608" y="2663301"/>
+            <a:ext cx="2627790" cy="2467992"/>
+          </a:xfrm>
+          <a:custGeom>
+            <a:avLst/>
+            <a:gdLst>
+              <a:gd name="connsiteX0" fmla="*/ 0 w 2627790"/>
+              <a:gd name="connsiteY0" fmla="*/ 0 h 2467992"/>
+              <a:gd name="connsiteX1" fmla="*/ 683225 w 2627790"/>
+              <a:gd name="connsiteY1" fmla="*/ 0 h 2467992"/>
+              <a:gd name="connsiteX2" fmla="*/ 1340173 w 2627790"/>
+              <a:gd name="connsiteY2" fmla="*/ 0 h 2467992"/>
+              <a:gd name="connsiteX3" fmla="*/ 1997120 w 2627790"/>
+              <a:gd name="connsiteY3" fmla="*/ 0 h 2467992"/>
+              <a:gd name="connsiteX4" fmla="*/ 2627790 w 2627790"/>
+              <a:gd name="connsiteY4" fmla="*/ 0 h 2467992"/>
+              <a:gd name="connsiteX5" fmla="*/ 2627790 w 2627790"/>
+              <a:gd name="connsiteY5" fmla="*/ 542958 h 2467992"/>
+              <a:gd name="connsiteX6" fmla="*/ 2627790 w 2627790"/>
+              <a:gd name="connsiteY6" fmla="*/ 1135276 h 2467992"/>
+              <a:gd name="connsiteX7" fmla="*/ 2627790 w 2627790"/>
+              <a:gd name="connsiteY7" fmla="*/ 1702914 h 2467992"/>
+              <a:gd name="connsiteX8" fmla="*/ 2627790 w 2627790"/>
+              <a:gd name="connsiteY8" fmla="*/ 2467992 h 2467992"/>
+              <a:gd name="connsiteX9" fmla="*/ 2049676 w 2627790"/>
+              <a:gd name="connsiteY9" fmla="*/ 2467992 h 2467992"/>
+              <a:gd name="connsiteX10" fmla="*/ 1471562 w 2627790"/>
+              <a:gd name="connsiteY10" fmla="*/ 2467992 h 2467992"/>
+              <a:gd name="connsiteX11" fmla="*/ 762059 w 2627790"/>
+              <a:gd name="connsiteY11" fmla="*/ 2467992 h 2467992"/>
+              <a:gd name="connsiteX12" fmla="*/ 0 w 2627790"/>
+              <a:gd name="connsiteY12" fmla="*/ 2467992 h 2467992"/>
+              <a:gd name="connsiteX13" fmla="*/ 0 w 2627790"/>
+              <a:gd name="connsiteY13" fmla="*/ 1801634 h 2467992"/>
+              <a:gd name="connsiteX14" fmla="*/ 0 w 2627790"/>
+              <a:gd name="connsiteY14" fmla="*/ 1135276 h 2467992"/>
+              <a:gd name="connsiteX15" fmla="*/ 0 w 2627790"/>
+              <a:gd name="connsiteY15" fmla="*/ 542958 h 2467992"/>
+              <a:gd name="connsiteX16" fmla="*/ 0 w 2627790"/>
+              <a:gd name="connsiteY16" fmla="*/ 0 h 2467992"/>
+            </a:gdLst>
+            <a:ahLst/>
+            <a:cxnLst>
+              <a:cxn ang="0">
+                <a:pos x="connsiteX0" y="connsiteY0"/>
+              </a:cxn>
+              <a:cxn ang="0">
+                <a:pos x="connsiteX1" y="connsiteY1"/>
+              </a:cxn>
+              <a:cxn ang="0">
+                <a:pos x="connsiteX2" y="connsiteY2"/>
+              </a:cxn>
+              <a:cxn ang="0">
+                <a:pos x="connsiteX3" y="connsiteY3"/>
+              </a:cxn>
+              <a:cxn ang="0">
+                <a:pos x="connsiteX4" y="connsiteY4"/>
+              </a:cxn>
+              <a:cxn ang="0">
+                <a:pos x="connsiteX5" y="connsiteY5"/>
+              </a:cxn>
+              <a:cxn ang="0">
+                <a:pos x="connsiteX6" y="connsiteY6"/>
+              </a:cxn>
+              <a:cxn ang="0">
+                <a:pos x="connsiteX7" y="connsiteY7"/>
+              </a:cxn>
+              <a:cxn ang="0">
+                <a:pos x="connsiteX8" y="connsiteY8"/>
+              </a:cxn>
+              <a:cxn ang="0">
+                <a:pos x="connsiteX9" y="connsiteY9"/>
+              </a:cxn>
+              <a:cxn ang="0">
+                <a:pos x="connsiteX10" y="connsiteY10"/>
+              </a:cxn>
+              <a:cxn ang="0">
+                <a:pos x="connsiteX11" y="connsiteY11"/>
+              </a:cxn>
+              <a:cxn ang="0">
+                <a:pos x="connsiteX12" y="connsiteY12"/>
+              </a:cxn>
+              <a:cxn ang="0">
+                <a:pos x="connsiteX13" y="connsiteY13"/>
+              </a:cxn>
+              <a:cxn ang="0">
+                <a:pos x="connsiteX14" y="connsiteY14"/>
+              </a:cxn>
+              <a:cxn ang="0">
+                <a:pos x="connsiteX15" y="connsiteY15"/>
+              </a:cxn>
+              <a:cxn ang="0">
+                <a:pos x="connsiteX16" y="connsiteY16"/>
+              </a:cxn>
+            </a:cxnLst>
+            <a:rect l="l" t="t" r="r" b="b"/>
+            <a:pathLst>
+              <a:path w="2627790" h="2467992" extrusionOk="0">
+                <a:moveTo>
+                  <a:pt x="0" y="0"/>
+                </a:moveTo>
+                <a:cubicBezTo>
+                  <a:pt x="286850" y="16510"/>
+                  <a:pt x="411357" y="-7733"/>
+                  <a:pt x="683225" y="0"/>
+                </a:cubicBezTo>
+                <a:cubicBezTo>
+                  <a:pt x="955093" y="7733"/>
+                  <a:pt x="1016117" y="-14499"/>
+                  <a:pt x="1340173" y="0"/>
+                </a:cubicBezTo>
+                <a:cubicBezTo>
+                  <a:pt x="1664229" y="14499"/>
+                  <a:pt x="1708287" y="19759"/>
+                  <a:pt x="1997120" y="0"/>
+                </a:cubicBezTo>
+                <a:cubicBezTo>
+                  <a:pt x="2285953" y="-19759"/>
+                  <a:pt x="2386620" y="10399"/>
+                  <a:pt x="2627790" y="0"/>
+                </a:cubicBezTo>
+                <a:cubicBezTo>
+                  <a:pt x="2637180" y="212375"/>
+                  <a:pt x="2602121" y="281151"/>
+                  <a:pt x="2627790" y="542958"/>
+                </a:cubicBezTo>
+                <a:cubicBezTo>
+                  <a:pt x="2653459" y="804765"/>
+                  <a:pt x="2634331" y="904706"/>
+                  <a:pt x="2627790" y="1135276"/>
+                </a:cubicBezTo>
+                <a:cubicBezTo>
+                  <a:pt x="2621249" y="1365846"/>
+                  <a:pt x="2649010" y="1484433"/>
+                  <a:pt x="2627790" y="1702914"/>
+                </a:cubicBezTo>
+                <a:cubicBezTo>
+                  <a:pt x="2606570" y="1921395"/>
+                  <a:pt x="2634245" y="2125489"/>
+                  <a:pt x="2627790" y="2467992"/>
+                </a:cubicBezTo>
+                <a:cubicBezTo>
+                  <a:pt x="2366169" y="2473193"/>
+                  <a:pt x="2322570" y="2463109"/>
+                  <a:pt x="2049676" y="2467992"/>
+                </a:cubicBezTo>
+                <a:cubicBezTo>
+                  <a:pt x="1776782" y="2472875"/>
+                  <a:pt x="1726118" y="2474968"/>
+                  <a:pt x="1471562" y="2467992"/>
+                </a:cubicBezTo>
+                <a:cubicBezTo>
+                  <a:pt x="1217006" y="2461016"/>
+                  <a:pt x="948043" y="2492101"/>
+                  <a:pt x="762059" y="2467992"/>
+                </a:cubicBezTo>
+                <a:cubicBezTo>
+                  <a:pt x="576075" y="2443883"/>
+                  <a:pt x="237261" y="2460264"/>
+                  <a:pt x="0" y="2467992"/>
+                </a:cubicBezTo>
+                <a:cubicBezTo>
+                  <a:pt x="-13149" y="2183469"/>
+                  <a:pt x="-32228" y="2082051"/>
+                  <a:pt x="0" y="1801634"/>
+                </a:cubicBezTo>
+                <a:cubicBezTo>
+                  <a:pt x="32228" y="1521217"/>
+                  <a:pt x="-9106" y="1400787"/>
+                  <a:pt x="0" y="1135276"/>
+                </a:cubicBezTo>
+                <a:cubicBezTo>
+                  <a:pt x="9106" y="869765"/>
+                  <a:pt x="-28431" y="820350"/>
+                  <a:pt x="0" y="542958"/>
+                </a:cubicBezTo>
+                <a:cubicBezTo>
+                  <a:pt x="28431" y="265566"/>
+                  <a:pt x="15378" y="163565"/>
+                  <a:pt x="0" y="0"/>
+                </a:cubicBezTo>
+                <a:close/>
+              </a:path>
+            </a:pathLst>
+          </a:custGeom>
+          <a:noFill/>
+          <a:ln w="28575">
+            <a:solidFill>
+              <a:schemeClr val="accent2"/>
+            </a:solidFill>
+            <a:prstDash val="sysDash"/>
+            <a:extLst>
+              <a:ext uri="{C807C97D-BFC1-408E-A445-0C87EB9F89A2}">
+                <ask:lineSketchStyleProps xmlns:ask="http://schemas.microsoft.com/office/drawing/2018/sketchyshapes" sd="188121421">
+                  <a:prstGeom prst="rect">
+                    <a:avLst/>
+                  </a:prstGeom>
+                  <ask:type>
+                    <ask:lineSketchFreehand/>
+                  </ask:type>
+                </ask:lineSketchStyleProps>
+              </a:ext>
+            </a:extLst>
+          </a:ln>
+        </p:spPr>
+        <p:style>
+          <a:lnRef idx="2">
+            <a:schemeClr val="accent1">
+              <a:shade val="50000"/>
+            </a:schemeClr>
+          </a:lnRef>
+          <a:fillRef idx="1">
+            <a:schemeClr val="accent1"/>
+          </a:fillRef>
+          <a:effectRef idx="0">
+            <a:schemeClr val="accent1"/>
+          </a:effectRef>
+          <a:fontRef idx="minor">
+            <a:schemeClr val="lt1"/>
+          </a:fontRef>
+        </p:style>
+        <p:txBody>
+          <a:bodyPr rtlCol="0" anchor="ctr"/>
+          <a:lstStyle/>
+          <a:p>
+            <a:pPr algn="ctr"/>
+            <a:endParaRPr lang="zh-CN" altLang="en-US"/>
+          </a:p>
+        </p:txBody>
+      </p:sp>
+      <p:sp>
+        <p:nvSpPr>
+          <p:cNvPr id="8" name="文本框 7">
+            <a:extLst>
+              <a:ext uri="{FF2B5EF4-FFF2-40B4-BE49-F238E27FC236}">
+                <a16:creationId xmlns:a16="http://schemas.microsoft.com/office/drawing/2014/main" id="{FE3B5E96-B42E-4C3B-960C-C1BC15DD5D4D}"/>
+              </a:ext>
+            </a:extLst>
+          </p:cNvPr>
+          <p:cNvSpPr txBox="1"/>
+          <p:nvPr/>
+        </p:nvSpPr>
+        <p:spPr>
+          <a:xfrm>
+            <a:off x="2076886" y="3587273"/>
+            <a:ext cx="800219" cy="461665"/>
+          </a:xfrm>
+          <a:prstGeom prst="rect">
+            <a:avLst/>
+          </a:prstGeom>
+          <a:noFill/>
+        </p:spPr>
+        <p:txBody>
+          <a:bodyPr wrap="none" rtlCol="0">
+            <a:spAutoFit/>
+          </a:bodyPr>
+          <a:lstStyle/>
+          <a:p>
+            <a:r>
+              <a:rPr lang="zh-CN" altLang="en-US" sz="2400" dirty="0">
+                <a:solidFill>
+                  <a:schemeClr val="tx1">
+                    <a:lumMod val="50000"/>
+                    <a:lumOff val="50000"/>
+                  </a:schemeClr>
+                </a:solidFill>
+              </a:rPr>
+              <a:t>文字</a:t>
+            </a:r>
+          </a:p>
+        </p:txBody>
+      </p:sp>
+      <p:sp>
+        <p:nvSpPr>
+          <p:cNvPr id="9" name="矩形 8">
+            <a:extLst>
+              <a:ext uri="{FF2B5EF4-FFF2-40B4-BE49-F238E27FC236}">
+                <a16:creationId xmlns:a16="http://schemas.microsoft.com/office/drawing/2014/main" id="{C9115A8C-AF84-44BE-A529-F8DFBE3E4DCF}"/>
+              </a:ext>
+            </a:extLst>
+          </p:cNvPr>
+          <p:cNvSpPr/>
+          <p:nvPr/>
+        </p:nvSpPr>
+        <p:spPr>
+          <a:xfrm>
+            <a:off x="3994952" y="2663301"/>
+            <a:ext cx="1171851" cy="2467992"/>
+          </a:xfrm>
+          <a:custGeom>
+            <a:avLst/>
+            <a:gdLst>
+              <a:gd name="connsiteX0" fmla="*/ 0 w 1171851"/>
+              <a:gd name="connsiteY0" fmla="*/ 0 h 2467992"/>
+              <a:gd name="connsiteX1" fmla="*/ 597644 w 1171851"/>
+              <a:gd name="connsiteY1" fmla="*/ 0 h 2467992"/>
+              <a:gd name="connsiteX2" fmla="*/ 1171851 w 1171851"/>
+              <a:gd name="connsiteY2" fmla="*/ 0 h 2467992"/>
+              <a:gd name="connsiteX3" fmla="*/ 1171851 w 1171851"/>
+              <a:gd name="connsiteY3" fmla="*/ 616998 h 2467992"/>
+              <a:gd name="connsiteX4" fmla="*/ 1171851 w 1171851"/>
+              <a:gd name="connsiteY4" fmla="*/ 1184636 h 2467992"/>
+              <a:gd name="connsiteX5" fmla="*/ 1171851 w 1171851"/>
+              <a:gd name="connsiteY5" fmla="*/ 1727594 h 2467992"/>
+              <a:gd name="connsiteX6" fmla="*/ 1171851 w 1171851"/>
+              <a:gd name="connsiteY6" fmla="*/ 2467992 h 2467992"/>
+              <a:gd name="connsiteX7" fmla="*/ 609363 w 1171851"/>
+              <a:gd name="connsiteY7" fmla="*/ 2467992 h 2467992"/>
+              <a:gd name="connsiteX8" fmla="*/ 0 w 1171851"/>
+              <a:gd name="connsiteY8" fmla="*/ 2467992 h 2467992"/>
+              <a:gd name="connsiteX9" fmla="*/ 0 w 1171851"/>
+              <a:gd name="connsiteY9" fmla="*/ 1801634 h 2467992"/>
+              <a:gd name="connsiteX10" fmla="*/ 0 w 1171851"/>
+              <a:gd name="connsiteY10" fmla="*/ 1209316 h 2467992"/>
+              <a:gd name="connsiteX11" fmla="*/ 0 w 1171851"/>
+              <a:gd name="connsiteY11" fmla="*/ 542958 h 2467992"/>
+              <a:gd name="connsiteX12" fmla="*/ 0 w 1171851"/>
+              <a:gd name="connsiteY12" fmla="*/ 0 h 2467992"/>
+            </a:gdLst>
+            <a:ahLst/>
+            <a:cxnLst>
+              <a:cxn ang="0">
+                <a:pos x="connsiteX0" y="connsiteY0"/>
+              </a:cxn>
+              <a:cxn ang="0">
+                <a:pos x="connsiteX1" y="connsiteY1"/>
+              </a:cxn>
+              <a:cxn ang="0">
+                <a:pos x="connsiteX2" y="connsiteY2"/>
+              </a:cxn>
+              <a:cxn ang="0">
+                <a:pos x="connsiteX3" y="connsiteY3"/>
+              </a:cxn>
+              <a:cxn ang="0">
+                <a:pos x="connsiteX4" y="connsiteY4"/>
+              </a:cxn>
+              <a:cxn ang="0">
+                <a:pos x="connsiteX5" y="connsiteY5"/>
+              </a:cxn>
+              <a:cxn ang="0">
+                <a:pos x="connsiteX6" y="connsiteY6"/>
+              </a:cxn>
+              <a:cxn ang="0">
+                <a:pos x="connsiteX7" y="connsiteY7"/>
+              </a:cxn>
+              <a:cxn ang="0">
+                <a:pos x="connsiteX8" y="connsiteY8"/>
+              </a:cxn>
+              <a:cxn ang="0">
+                <a:pos x="connsiteX9" y="connsiteY9"/>
+              </a:cxn>
+              <a:cxn ang="0">
+                <a:pos x="connsiteX10" y="connsiteY10"/>
+              </a:cxn>
+              <a:cxn ang="0">
+                <a:pos x="connsiteX11" y="connsiteY11"/>
+              </a:cxn>
+              <a:cxn ang="0">
+                <a:pos x="connsiteX12" y="connsiteY12"/>
+              </a:cxn>
+            </a:cxnLst>
+            <a:rect l="l" t="t" r="r" b="b"/>
+            <a:pathLst>
+              <a:path w="1171851" h="2467992" extrusionOk="0">
+                <a:moveTo>
+                  <a:pt x="0" y="0"/>
+                </a:moveTo>
+                <a:cubicBezTo>
+                  <a:pt x="261680" y="-26206"/>
+                  <a:pt x="460987" y="14094"/>
+                  <a:pt x="597644" y="0"/>
+                </a:cubicBezTo>
+                <a:cubicBezTo>
+                  <a:pt x="734301" y="-14094"/>
+                  <a:pt x="1020338" y="23237"/>
+                  <a:pt x="1171851" y="0"/>
+                </a:cubicBezTo>
+                <a:cubicBezTo>
+                  <a:pt x="1169655" y="175787"/>
+                  <a:pt x="1156667" y="376708"/>
+                  <a:pt x="1171851" y="616998"/>
+                </a:cubicBezTo>
+                <a:cubicBezTo>
+                  <a:pt x="1187035" y="857288"/>
+                  <a:pt x="1195436" y="958851"/>
+                  <a:pt x="1171851" y="1184636"/>
+                </a:cubicBezTo>
+                <a:cubicBezTo>
+                  <a:pt x="1148266" y="1410421"/>
+                  <a:pt x="1146182" y="1465787"/>
+                  <a:pt x="1171851" y="1727594"/>
+                </a:cubicBezTo>
+                <a:cubicBezTo>
+                  <a:pt x="1197520" y="1989401"/>
+                  <a:pt x="1142074" y="2119527"/>
+                  <a:pt x="1171851" y="2467992"/>
+                </a:cubicBezTo>
+                <a:cubicBezTo>
+                  <a:pt x="919245" y="2457844"/>
+                  <a:pt x="800573" y="2440736"/>
+                  <a:pt x="609363" y="2467992"/>
+                </a:cubicBezTo>
+                <a:cubicBezTo>
+                  <a:pt x="418153" y="2495248"/>
+                  <a:pt x="195633" y="2487170"/>
+                  <a:pt x="0" y="2467992"/>
+                </a:cubicBezTo>
+                <a:cubicBezTo>
+                  <a:pt x="17291" y="2217005"/>
+                  <a:pt x="-28440" y="2099164"/>
+                  <a:pt x="0" y="1801634"/>
+                </a:cubicBezTo>
+                <a:cubicBezTo>
+                  <a:pt x="28440" y="1504104"/>
+                  <a:pt x="-3209" y="1432915"/>
+                  <a:pt x="0" y="1209316"/>
+                </a:cubicBezTo>
+                <a:cubicBezTo>
+                  <a:pt x="3209" y="985717"/>
+                  <a:pt x="32158" y="770325"/>
+                  <a:pt x="0" y="542958"/>
+                </a:cubicBezTo>
+                <a:cubicBezTo>
+                  <a:pt x="-32158" y="315591"/>
+                  <a:pt x="-3473" y="129864"/>
+                  <a:pt x="0" y="0"/>
+                </a:cubicBezTo>
+                <a:close/>
+              </a:path>
+            </a:pathLst>
+          </a:custGeom>
+          <a:noFill/>
+          <a:ln w="28575">
+            <a:solidFill>
+              <a:schemeClr val="accent6">
+                <a:lumMod val="75000"/>
+              </a:schemeClr>
+            </a:solidFill>
+            <a:prstDash val="sysDash"/>
+            <a:extLst>
+              <a:ext uri="{C807C97D-BFC1-408E-A445-0C87EB9F89A2}">
+                <ask:lineSketchStyleProps xmlns:ask="http://schemas.microsoft.com/office/drawing/2018/sketchyshapes" sd="188121421">
+                  <a:prstGeom prst="rect">
+                    <a:avLst/>
+                  </a:prstGeom>
+                  <ask:type>
+                    <ask:lineSketchFreehand/>
+                  </ask:type>
+                </ask:lineSketchStyleProps>
+              </a:ext>
+            </a:extLst>
+          </a:ln>
+        </p:spPr>
+        <p:style>
+          <a:lnRef idx="2">
+            <a:schemeClr val="accent1">
+              <a:shade val="50000"/>
+            </a:schemeClr>
+          </a:lnRef>
+          <a:fillRef idx="1">
+            <a:schemeClr val="accent1"/>
+          </a:fillRef>
+          <a:effectRef idx="0">
+            <a:schemeClr val="accent1"/>
+          </a:effectRef>
+          <a:fontRef idx="minor">
+            <a:schemeClr val="lt1"/>
+          </a:fontRef>
+        </p:style>
+        <p:txBody>
+          <a:bodyPr rtlCol="0" anchor="ctr"/>
+          <a:lstStyle/>
+          <a:p>
+            <a:pPr algn="ctr"/>
+            <a:endParaRPr lang="zh-CN" altLang="en-US"/>
+          </a:p>
+        </p:txBody>
+      </p:sp>
+      <p:sp>
+        <p:nvSpPr>
+          <p:cNvPr id="10" name="文本框 9">
+            <a:extLst>
+              <a:ext uri="{FF2B5EF4-FFF2-40B4-BE49-F238E27FC236}">
+                <a16:creationId xmlns:a16="http://schemas.microsoft.com/office/drawing/2014/main" id="{6D220B65-9ABD-42F5-B255-42AE9E9AB6A9}"/>
+              </a:ext>
+            </a:extLst>
+          </p:cNvPr>
+          <p:cNvSpPr txBox="1"/>
+          <p:nvPr/>
+        </p:nvSpPr>
+        <p:spPr>
+          <a:xfrm>
+            <a:off x="4154260" y="3618345"/>
+            <a:ext cx="800219" cy="461665"/>
+          </a:xfrm>
+          <a:prstGeom prst="rect">
+            <a:avLst/>
+          </a:prstGeom>
+          <a:noFill/>
+        </p:spPr>
+        <p:txBody>
+          <a:bodyPr wrap="none" rtlCol="0">
+            <a:spAutoFit/>
+          </a:bodyPr>
+          <a:lstStyle/>
+          <a:p>
+            <a:r>
+              <a:rPr lang="zh-CN" altLang="en-US" sz="2400" dirty="0">
+                <a:solidFill>
+                  <a:schemeClr val="tx1">
+                    <a:lumMod val="50000"/>
+                    <a:lumOff val="50000"/>
+                  </a:schemeClr>
+                </a:solidFill>
+              </a:rPr>
+              <a:t>图片</a:t>
+            </a:r>
+          </a:p>
+        </p:txBody>
+      </p:sp>
+      <p:sp>
+        <p:nvSpPr>
+          <p:cNvPr id="11" name="矩形 10">
+            <a:extLst>
+              <a:ext uri="{FF2B5EF4-FFF2-40B4-BE49-F238E27FC236}">
+                <a16:creationId xmlns:a16="http://schemas.microsoft.com/office/drawing/2014/main" id="{4C1218AF-3390-4BF2-AF3A-C593A9C419C1}"/>
+              </a:ext>
+            </a:extLst>
+          </p:cNvPr>
+          <p:cNvSpPr/>
+          <p:nvPr/>
+        </p:nvSpPr>
+        <p:spPr>
+          <a:xfrm>
+            <a:off x="5940642" y="1704513"/>
+            <a:ext cx="3977196" cy="870011"/>
+          </a:xfrm>
+          <a:custGeom>
+            <a:avLst/>
+            <a:gdLst>
+              <a:gd name="connsiteX0" fmla="*/ 0 w 3977196"/>
+              <a:gd name="connsiteY0" fmla="*/ 0 h 870011"/>
+              <a:gd name="connsiteX1" fmla="*/ 702638 w 3977196"/>
+              <a:gd name="connsiteY1" fmla="*/ 0 h 870011"/>
+              <a:gd name="connsiteX2" fmla="*/ 1365504 w 3977196"/>
+              <a:gd name="connsiteY2" fmla="*/ 0 h 870011"/>
+              <a:gd name="connsiteX3" fmla="*/ 2028370 w 3977196"/>
+              <a:gd name="connsiteY3" fmla="*/ 0 h 870011"/>
+              <a:gd name="connsiteX4" fmla="*/ 2770780 w 3977196"/>
+              <a:gd name="connsiteY4" fmla="*/ 0 h 870011"/>
+              <a:gd name="connsiteX5" fmla="*/ 3314330 w 3977196"/>
+              <a:gd name="connsiteY5" fmla="*/ 0 h 870011"/>
+              <a:gd name="connsiteX6" fmla="*/ 3977196 w 3977196"/>
+              <a:gd name="connsiteY6" fmla="*/ 0 h 870011"/>
+              <a:gd name="connsiteX7" fmla="*/ 3977196 w 3977196"/>
+              <a:gd name="connsiteY7" fmla="*/ 417605 h 870011"/>
+              <a:gd name="connsiteX8" fmla="*/ 3977196 w 3977196"/>
+              <a:gd name="connsiteY8" fmla="*/ 870011 h 870011"/>
+              <a:gd name="connsiteX9" fmla="*/ 3433646 w 3977196"/>
+              <a:gd name="connsiteY9" fmla="*/ 870011 h 870011"/>
+              <a:gd name="connsiteX10" fmla="*/ 2890096 w 3977196"/>
+              <a:gd name="connsiteY10" fmla="*/ 870011 h 870011"/>
+              <a:gd name="connsiteX11" fmla="*/ 2147686 w 3977196"/>
+              <a:gd name="connsiteY11" fmla="*/ 870011 h 870011"/>
+              <a:gd name="connsiteX12" fmla="*/ 1604136 w 3977196"/>
+              <a:gd name="connsiteY12" fmla="*/ 870011 h 870011"/>
+              <a:gd name="connsiteX13" fmla="*/ 861726 w 3977196"/>
+              <a:gd name="connsiteY13" fmla="*/ 870011 h 870011"/>
+              <a:gd name="connsiteX14" fmla="*/ 0 w 3977196"/>
+              <a:gd name="connsiteY14" fmla="*/ 870011 h 870011"/>
+              <a:gd name="connsiteX15" fmla="*/ 0 w 3977196"/>
+              <a:gd name="connsiteY15" fmla="*/ 461106 h 870011"/>
+              <a:gd name="connsiteX16" fmla="*/ 0 w 3977196"/>
+              <a:gd name="connsiteY16" fmla="*/ 0 h 870011"/>
+            </a:gdLst>
+            <a:ahLst/>
+            <a:cxnLst>
+              <a:cxn ang="0">
+                <a:pos x="connsiteX0" y="connsiteY0"/>
+              </a:cxn>
+              <a:cxn ang="0">
+                <a:pos x="connsiteX1" y="connsiteY1"/>
+              </a:cxn>
+              <a:cxn ang="0">
+                <a:pos x="connsiteX2" y="connsiteY2"/>
+              </a:cxn>
+              <a:cxn ang="0">
+                <a:pos x="connsiteX3" y="connsiteY3"/>
+              </a:cxn>
+              <a:cxn ang="0">
+                <a:pos x="connsiteX4" y="connsiteY4"/>
+              </a:cxn>
+              <a:cxn ang="0">
+                <a:pos x="connsiteX5" y="connsiteY5"/>
+              </a:cxn>
+              <a:cxn ang="0">
+                <a:pos x="connsiteX6" y="connsiteY6"/>
+              </a:cxn>
+              <a:cxn ang="0">
+                <a:pos x="connsiteX7" y="connsiteY7"/>
+              </a:cxn>
+              <a:cxn ang="0">
+                <a:pos x="connsiteX8" y="connsiteY8"/>
+              </a:cxn>
+              <a:cxn ang="0">
+                <a:pos x="connsiteX9" y="connsiteY9"/>
+              </a:cxn>
+              <a:cxn ang="0">
+                <a:pos x="connsiteX10" y="connsiteY10"/>
+              </a:cxn>
+              <a:cxn ang="0">
+                <a:pos x="connsiteX11" y="connsiteY11"/>
+              </a:cxn>
+              <a:cxn ang="0">
+                <a:pos x="connsiteX12" y="connsiteY12"/>
+              </a:cxn>
+              <a:cxn ang="0">
+                <a:pos x="connsiteX13" y="connsiteY13"/>
+              </a:cxn>
+              <a:cxn ang="0">
+                <a:pos x="connsiteX14" y="connsiteY14"/>
+              </a:cxn>
+              <a:cxn ang="0">
+                <a:pos x="connsiteX15" y="connsiteY15"/>
+              </a:cxn>
+              <a:cxn ang="0">
+                <a:pos x="connsiteX16" y="connsiteY16"/>
+              </a:cxn>
+            </a:cxnLst>
+            <a:rect l="l" t="t" r="r" b="b"/>
+            <a:pathLst>
+              <a:path w="3977196" h="870011" extrusionOk="0">
+                <a:moveTo>
+                  <a:pt x="0" y="0"/>
+                </a:moveTo>
+                <a:cubicBezTo>
+                  <a:pt x="288330" y="14418"/>
+                  <a:pt x="427840" y="-31252"/>
+                  <a:pt x="702638" y="0"/>
+                </a:cubicBezTo>
+                <a:cubicBezTo>
+                  <a:pt x="977436" y="31252"/>
+                  <a:pt x="1212926" y="19599"/>
+                  <a:pt x="1365504" y="0"/>
+                </a:cubicBezTo>
+                <a:cubicBezTo>
+                  <a:pt x="1518082" y="-19599"/>
+                  <a:pt x="1854984" y="84"/>
+                  <a:pt x="2028370" y="0"/>
+                </a:cubicBezTo>
+                <a:cubicBezTo>
+                  <a:pt x="2201756" y="-84"/>
+                  <a:pt x="2480966" y="24393"/>
+                  <a:pt x="2770780" y="0"/>
+                </a:cubicBezTo>
+                <a:cubicBezTo>
+                  <a:pt x="3060594" y="-24393"/>
+                  <a:pt x="3142808" y="7435"/>
+                  <a:pt x="3314330" y="0"/>
+                </a:cubicBezTo>
+                <a:cubicBezTo>
+                  <a:pt x="3485852" y="-7435"/>
+                  <a:pt x="3809760" y="-26147"/>
+                  <a:pt x="3977196" y="0"/>
+                </a:cubicBezTo>
+                <a:cubicBezTo>
+                  <a:pt x="3968352" y="148965"/>
+                  <a:pt x="3958213" y="254262"/>
+                  <a:pt x="3977196" y="417605"/>
+                </a:cubicBezTo>
+                <a:cubicBezTo>
+                  <a:pt x="3996179" y="580948"/>
+                  <a:pt x="3973321" y="747097"/>
+                  <a:pt x="3977196" y="870011"/>
+                </a:cubicBezTo>
+                <a:cubicBezTo>
+                  <a:pt x="3730988" y="893171"/>
+                  <a:pt x="3558083" y="867314"/>
+                  <a:pt x="3433646" y="870011"/>
+                </a:cubicBezTo>
+                <a:cubicBezTo>
+                  <a:pt x="3309209" y="872709"/>
+                  <a:pt x="3121530" y="883082"/>
+                  <a:pt x="2890096" y="870011"/>
+                </a:cubicBezTo>
+                <a:cubicBezTo>
+                  <a:pt x="2658662" y="856941"/>
+                  <a:pt x="2380322" y="901157"/>
+                  <a:pt x="2147686" y="870011"/>
+                </a:cubicBezTo>
+                <a:cubicBezTo>
+                  <a:pt x="1915050" y="838866"/>
+                  <a:pt x="1788820" y="881691"/>
+                  <a:pt x="1604136" y="870011"/>
+                </a:cubicBezTo>
+                <a:cubicBezTo>
+                  <a:pt x="1419452" y="858332"/>
+                  <a:pt x="1041270" y="847461"/>
+                  <a:pt x="861726" y="870011"/>
+                </a:cubicBezTo>
+                <a:cubicBezTo>
+                  <a:pt x="682182" y="892562"/>
+                  <a:pt x="238444" y="872000"/>
+                  <a:pt x="0" y="870011"/>
+                </a:cubicBezTo>
+                <a:cubicBezTo>
+                  <a:pt x="9039" y="719391"/>
+                  <a:pt x="-11052" y="546301"/>
+                  <a:pt x="0" y="461106"/>
+                </a:cubicBezTo>
+                <a:cubicBezTo>
+                  <a:pt x="11052" y="375912"/>
+                  <a:pt x="9697" y="162931"/>
+                  <a:pt x="0" y="0"/>
+                </a:cubicBezTo>
+                <a:close/>
+              </a:path>
+            </a:pathLst>
+          </a:custGeom>
+          <a:noFill/>
+          <a:ln w="28575">
+            <a:solidFill>
+              <a:schemeClr val="accent2"/>
+            </a:solidFill>
+            <a:prstDash val="sysDash"/>
+            <a:extLst>
+              <a:ext uri="{C807C97D-BFC1-408E-A445-0C87EB9F89A2}">
+                <ask:lineSketchStyleProps xmlns:ask="http://schemas.microsoft.com/office/drawing/2018/sketchyshapes" sd="188121421">
+                  <a:prstGeom prst="rect">
+                    <a:avLst/>
+                  </a:prstGeom>
+                  <ask:type>
+                    <ask:lineSketchFreehand/>
+                  </ask:type>
+                </ask:lineSketchStyleProps>
+              </a:ext>
+            </a:extLst>
+          </a:ln>
+        </p:spPr>
+        <p:style>
+          <a:lnRef idx="2">
+            <a:schemeClr val="accent1">
+              <a:shade val="50000"/>
+            </a:schemeClr>
+          </a:lnRef>
+          <a:fillRef idx="1">
+            <a:schemeClr val="accent1"/>
+          </a:fillRef>
+          <a:effectRef idx="0">
+            <a:schemeClr val="accent1"/>
+          </a:effectRef>
+          <a:fontRef idx="minor">
+            <a:schemeClr val="lt1"/>
+          </a:fontRef>
+        </p:style>
+        <p:txBody>
+          <a:bodyPr rtlCol="0" anchor="ctr"/>
+          <a:lstStyle/>
+          <a:p>
+            <a:pPr algn="ctr"/>
+            <a:endParaRPr lang="zh-CN" altLang="en-US"/>
+          </a:p>
+        </p:txBody>
+      </p:sp>
+      <p:sp>
+        <p:nvSpPr>
+          <p:cNvPr id="12" name="矩形 11">
+            <a:extLst>
+              <a:ext uri="{FF2B5EF4-FFF2-40B4-BE49-F238E27FC236}">
+                <a16:creationId xmlns:a16="http://schemas.microsoft.com/office/drawing/2014/main" id="{585BDAB3-8BEF-46AA-9600-B38BCEBCF11E}"/>
+              </a:ext>
+            </a:extLst>
+          </p:cNvPr>
+          <p:cNvSpPr/>
+          <p:nvPr/>
+        </p:nvSpPr>
+        <p:spPr>
+          <a:xfrm>
+            <a:off x="5950998" y="4257198"/>
+            <a:ext cx="3977196" cy="870011"/>
+          </a:xfrm>
+          <a:custGeom>
+            <a:avLst/>
+            <a:gdLst>
+              <a:gd name="connsiteX0" fmla="*/ 0 w 3977196"/>
+              <a:gd name="connsiteY0" fmla="*/ 0 h 870011"/>
+              <a:gd name="connsiteX1" fmla="*/ 702638 w 3977196"/>
+              <a:gd name="connsiteY1" fmla="*/ 0 h 870011"/>
+              <a:gd name="connsiteX2" fmla="*/ 1365504 w 3977196"/>
+              <a:gd name="connsiteY2" fmla="*/ 0 h 870011"/>
+              <a:gd name="connsiteX3" fmla="*/ 2028370 w 3977196"/>
+              <a:gd name="connsiteY3" fmla="*/ 0 h 870011"/>
+              <a:gd name="connsiteX4" fmla="*/ 2770780 w 3977196"/>
+              <a:gd name="connsiteY4" fmla="*/ 0 h 870011"/>
+              <a:gd name="connsiteX5" fmla="*/ 3314330 w 3977196"/>
+              <a:gd name="connsiteY5" fmla="*/ 0 h 870011"/>
+              <a:gd name="connsiteX6" fmla="*/ 3977196 w 3977196"/>
+              <a:gd name="connsiteY6" fmla="*/ 0 h 870011"/>
+              <a:gd name="connsiteX7" fmla="*/ 3977196 w 3977196"/>
+              <a:gd name="connsiteY7" fmla="*/ 417605 h 870011"/>
+              <a:gd name="connsiteX8" fmla="*/ 3977196 w 3977196"/>
+              <a:gd name="connsiteY8" fmla="*/ 870011 h 870011"/>
+              <a:gd name="connsiteX9" fmla="*/ 3433646 w 3977196"/>
+              <a:gd name="connsiteY9" fmla="*/ 870011 h 870011"/>
+              <a:gd name="connsiteX10" fmla="*/ 2890096 w 3977196"/>
+              <a:gd name="connsiteY10" fmla="*/ 870011 h 870011"/>
+              <a:gd name="connsiteX11" fmla="*/ 2147686 w 3977196"/>
+              <a:gd name="connsiteY11" fmla="*/ 870011 h 870011"/>
+              <a:gd name="connsiteX12" fmla="*/ 1604136 w 3977196"/>
+              <a:gd name="connsiteY12" fmla="*/ 870011 h 870011"/>
+              <a:gd name="connsiteX13" fmla="*/ 861726 w 3977196"/>
+              <a:gd name="connsiteY13" fmla="*/ 870011 h 870011"/>
+              <a:gd name="connsiteX14" fmla="*/ 0 w 3977196"/>
+              <a:gd name="connsiteY14" fmla="*/ 870011 h 870011"/>
+              <a:gd name="connsiteX15" fmla="*/ 0 w 3977196"/>
+              <a:gd name="connsiteY15" fmla="*/ 461106 h 870011"/>
+              <a:gd name="connsiteX16" fmla="*/ 0 w 3977196"/>
+              <a:gd name="connsiteY16" fmla="*/ 0 h 870011"/>
+            </a:gdLst>
+            <a:ahLst/>
+            <a:cxnLst>
+              <a:cxn ang="0">
+                <a:pos x="connsiteX0" y="connsiteY0"/>
+              </a:cxn>
+              <a:cxn ang="0">
+                <a:pos x="connsiteX1" y="connsiteY1"/>
+              </a:cxn>
+              <a:cxn ang="0">
+                <a:pos x="connsiteX2" y="connsiteY2"/>
+              </a:cxn>
+              <a:cxn ang="0">
+                <a:pos x="connsiteX3" y="connsiteY3"/>
+              </a:cxn>
+              <a:cxn ang="0">
+                <a:pos x="connsiteX4" y="connsiteY4"/>
+              </a:cxn>
+              <a:cxn ang="0">
+                <a:pos x="connsiteX5" y="connsiteY5"/>
+              </a:cxn>
+              <a:cxn ang="0">
+                <a:pos x="connsiteX6" y="connsiteY6"/>
+              </a:cxn>
+              <a:cxn ang="0">
+                <a:pos x="connsiteX7" y="connsiteY7"/>
+              </a:cxn>
+              <a:cxn ang="0">
+                <a:pos x="connsiteX8" y="connsiteY8"/>
+              </a:cxn>
+              <a:cxn ang="0">
+                <a:pos x="connsiteX9" y="connsiteY9"/>
+              </a:cxn>
+              <a:cxn ang="0">
+                <a:pos x="connsiteX10" y="connsiteY10"/>
+              </a:cxn>
+              <a:cxn ang="0">
+                <a:pos x="connsiteX11" y="connsiteY11"/>
+              </a:cxn>
+              <a:cxn ang="0">
+                <a:pos x="connsiteX12" y="connsiteY12"/>
+              </a:cxn>
+              <a:cxn ang="0">
+                <a:pos x="connsiteX13" y="connsiteY13"/>
+              </a:cxn>
+              <a:cxn ang="0">
+                <a:pos x="connsiteX14" y="connsiteY14"/>
+              </a:cxn>
+              <a:cxn ang="0">
+                <a:pos x="connsiteX15" y="connsiteY15"/>
+              </a:cxn>
+              <a:cxn ang="0">
+                <a:pos x="connsiteX16" y="connsiteY16"/>
+              </a:cxn>
+            </a:cxnLst>
+            <a:rect l="l" t="t" r="r" b="b"/>
+            <a:pathLst>
+              <a:path w="3977196" h="870011" extrusionOk="0">
+                <a:moveTo>
+                  <a:pt x="0" y="0"/>
+                </a:moveTo>
+                <a:cubicBezTo>
+                  <a:pt x="288330" y="14418"/>
+                  <a:pt x="427840" y="-31252"/>
+                  <a:pt x="702638" y="0"/>
+                </a:cubicBezTo>
+                <a:cubicBezTo>
+                  <a:pt x="977436" y="31252"/>
+                  <a:pt x="1212926" y="19599"/>
+                  <a:pt x="1365504" y="0"/>
+                </a:cubicBezTo>
+                <a:cubicBezTo>
+                  <a:pt x="1518082" y="-19599"/>
+                  <a:pt x="1854984" y="84"/>
+                  <a:pt x="2028370" y="0"/>
+                </a:cubicBezTo>
+                <a:cubicBezTo>
+                  <a:pt x="2201756" y="-84"/>
+                  <a:pt x="2480966" y="24393"/>
+                  <a:pt x="2770780" y="0"/>
+                </a:cubicBezTo>
+                <a:cubicBezTo>
+                  <a:pt x="3060594" y="-24393"/>
+                  <a:pt x="3142808" y="7435"/>
+                  <a:pt x="3314330" y="0"/>
+                </a:cubicBezTo>
+                <a:cubicBezTo>
+                  <a:pt x="3485852" y="-7435"/>
+                  <a:pt x="3809760" y="-26147"/>
+                  <a:pt x="3977196" y="0"/>
+                </a:cubicBezTo>
+                <a:cubicBezTo>
+                  <a:pt x="3968352" y="148965"/>
+                  <a:pt x="3958213" y="254262"/>
+                  <a:pt x="3977196" y="417605"/>
+                </a:cubicBezTo>
+                <a:cubicBezTo>
+                  <a:pt x="3996179" y="580948"/>
+                  <a:pt x="3973321" y="747097"/>
+                  <a:pt x="3977196" y="870011"/>
+                </a:cubicBezTo>
+                <a:cubicBezTo>
+                  <a:pt x="3730988" y="893171"/>
+                  <a:pt x="3558083" y="867314"/>
+                  <a:pt x="3433646" y="870011"/>
+                </a:cubicBezTo>
+                <a:cubicBezTo>
+                  <a:pt x="3309209" y="872709"/>
+                  <a:pt x="3121530" y="883082"/>
+                  <a:pt x="2890096" y="870011"/>
+                </a:cubicBezTo>
+                <a:cubicBezTo>
+                  <a:pt x="2658662" y="856941"/>
+                  <a:pt x="2380322" y="901157"/>
+                  <a:pt x="2147686" y="870011"/>
+                </a:cubicBezTo>
+                <a:cubicBezTo>
+                  <a:pt x="1915050" y="838866"/>
+                  <a:pt x="1788820" y="881691"/>
+                  <a:pt x="1604136" y="870011"/>
+                </a:cubicBezTo>
+                <a:cubicBezTo>
+                  <a:pt x="1419452" y="858332"/>
+                  <a:pt x="1041270" y="847461"/>
+                  <a:pt x="861726" y="870011"/>
+                </a:cubicBezTo>
+                <a:cubicBezTo>
+                  <a:pt x="682182" y="892562"/>
+                  <a:pt x="238444" y="872000"/>
+                  <a:pt x="0" y="870011"/>
+                </a:cubicBezTo>
+                <a:cubicBezTo>
+                  <a:pt x="9039" y="719391"/>
+                  <a:pt x="-11052" y="546301"/>
+                  <a:pt x="0" y="461106"/>
+                </a:cubicBezTo>
+                <a:cubicBezTo>
+                  <a:pt x="11052" y="375912"/>
+                  <a:pt x="9697" y="162931"/>
+                  <a:pt x="0" y="0"/>
+                </a:cubicBezTo>
+                <a:close/>
+              </a:path>
+            </a:pathLst>
+          </a:custGeom>
+          <a:noFill/>
+          <a:ln w="28575">
+            <a:solidFill>
+              <a:schemeClr val="accent2"/>
+            </a:solidFill>
+            <a:prstDash val="sysDash"/>
+            <a:extLst>
+              <a:ext uri="{C807C97D-BFC1-408E-A445-0C87EB9F89A2}">
+                <ask:lineSketchStyleProps xmlns:ask="http://schemas.microsoft.com/office/drawing/2018/sketchyshapes" sd="188121421">
+                  <a:prstGeom prst="rect">
+                    <a:avLst/>
+                  </a:prstGeom>
+                  <ask:type>
+                    <ask:lineSketchFreehand/>
+                  </ask:type>
+                </ask:lineSketchStyleProps>
+              </a:ext>
+            </a:extLst>
+          </a:ln>
+        </p:spPr>
+        <p:style>
+          <a:lnRef idx="2">
+            <a:schemeClr val="accent1">
+              <a:shade val="50000"/>
+            </a:schemeClr>
+          </a:lnRef>
+          <a:fillRef idx="1">
+            <a:schemeClr val="accent1"/>
+          </a:fillRef>
+          <a:effectRef idx="0">
+            <a:schemeClr val="accent1"/>
+          </a:effectRef>
+          <a:fontRef idx="minor">
+            <a:schemeClr val="lt1"/>
+          </a:fontRef>
+        </p:style>
+        <p:txBody>
+          <a:bodyPr rtlCol="0" anchor="ctr"/>
+          <a:lstStyle/>
+          <a:p>
+            <a:pPr algn="ctr"/>
+            <a:endParaRPr lang="zh-CN" altLang="en-US"/>
+          </a:p>
+        </p:txBody>
+      </p:sp>
+      <p:sp>
+        <p:nvSpPr>
+          <p:cNvPr id="14" name="矩形 13">
+            <a:extLst>
+              <a:ext uri="{FF2B5EF4-FFF2-40B4-BE49-F238E27FC236}">
+                <a16:creationId xmlns:a16="http://schemas.microsoft.com/office/drawing/2014/main" id="{A615BD62-A89A-4CFC-926E-6E68E2743050}"/>
+              </a:ext>
+            </a:extLst>
+          </p:cNvPr>
+          <p:cNvSpPr/>
+          <p:nvPr/>
+        </p:nvSpPr>
+        <p:spPr>
+          <a:xfrm>
+            <a:off x="5940642" y="2749681"/>
+            <a:ext cx="3977196" cy="1332359"/>
+          </a:xfrm>
+          <a:custGeom>
+            <a:avLst/>
+            <a:gdLst>
+              <a:gd name="connsiteX0" fmla="*/ 0 w 3977196"/>
+              <a:gd name="connsiteY0" fmla="*/ 0 h 1332359"/>
+              <a:gd name="connsiteX1" fmla="*/ 702638 w 3977196"/>
+              <a:gd name="connsiteY1" fmla="*/ 0 h 1332359"/>
+              <a:gd name="connsiteX2" fmla="*/ 1365504 w 3977196"/>
+              <a:gd name="connsiteY2" fmla="*/ 0 h 1332359"/>
+              <a:gd name="connsiteX3" fmla="*/ 2028370 w 3977196"/>
+              <a:gd name="connsiteY3" fmla="*/ 0 h 1332359"/>
+              <a:gd name="connsiteX4" fmla="*/ 2770780 w 3977196"/>
+              <a:gd name="connsiteY4" fmla="*/ 0 h 1332359"/>
+              <a:gd name="connsiteX5" fmla="*/ 3314330 w 3977196"/>
+              <a:gd name="connsiteY5" fmla="*/ 0 h 1332359"/>
+              <a:gd name="connsiteX6" fmla="*/ 3977196 w 3977196"/>
+              <a:gd name="connsiteY6" fmla="*/ 0 h 1332359"/>
+              <a:gd name="connsiteX7" fmla="*/ 3977196 w 3977196"/>
+              <a:gd name="connsiteY7" fmla="*/ 639532 h 1332359"/>
+              <a:gd name="connsiteX8" fmla="*/ 3977196 w 3977196"/>
+              <a:gd name="connsiteY8" fmla="*/ 1332359 h 1332359"/>
+              <a:gd name="connsiteX9" fmla="*/ 3433646 w 3977196"/>
+              <a:gd name="connsiteY9" fmla="*/ 1332359 h 1332359"/>
+              <a:gd name="connsiteX10" fmla="*/ 2890096 w 3977196"/>
+              <a:gd name="connsiteY10" fmla="*/ 1332359 h 1332359"/>
+              <a:gd name="connsiteX11" fmla="*/ 2147686 w 3977196"/>
+              <a:gd name="connsiteY11" fmla="*/ 1332359 h 1332359"/>
+              <a:gd name="connsiteX12" fmla="*/ 1604136 w 3977196"/>
+              <a:gd name="connsiteY12" fmla="*/ 1332359 h 1332359"/>
+              <a:gd name="connsiteX13" fmla="*/ 861726 w 3977196"/>
+              <a:gd name="connsiteY13" fmla="*/ 1332359 h 1332359"/>
+              <a:gd name="connsiteX14" fmla="*/ 0 w 3977196"/>
+              <a:gd name="connsiteY14" fmla="*/ 1332359 h 1332359"/>
+              <a:gd name="connsiteX15" fmla="*/ 0 w 3977196"/>
+              <a:gd name="connsiteY15" fmla="*/ 706150 h 1332359"/>
+              <a:gd name="connsiteX16" fmla="*/ 0 w 3977196"/>
+              <a:gd name="connsiteY16" fmla="*/ 0 h 1332359"/>
+            </a:gdLst>
+            <a:ahLst/>
+            <a:cxnLst>
+              <a:cxn ang="0">
+                <a:pos x="connsiteX0" y="connsiteY0"/>
+              </a:cxn>
+              <a:cxn ang="0">
+                <a:pos x="connsiteX1" y="connsiteY1"/>
+              </a:cxn>
+              <a:cxn ang="0">
+                <a:pos x="connsiteX2" y="connsiteY2"/>
+              </a:cxn>
+              <a:cxn ang="0">
+                <a:pos x="connsiteX3" y="connsiteY3"/>
+              </a:cxn>
+              <a:cxn ang="0">
+                <a:pos x="connsiteX4" y="connsiteY4"/>
+              </a:cxn>
+              <a:cxn ang="0">
+                <a:pos x="connsiteX5" y="connsiteY5"/>
+              </a:cxn>
+              <a:cxn ang="0">
+                <a:pos x="connsiteX6" y="connsiteY6"/>
+              </a:cxn>
+              <a:cxn ang="0">
+                <a:pos x="connsiteX7" y="connsiteY7"/>
+              </a:cxn>
+              <a:cxn ang="0">
+                <a:pos x="connsiteX8" y="connsiteY8"/>
+              </a:cxn>
+              <a:cxn ang="0">
+                <a:pos x="connsiteX9" y="connsiteY9"/>
+              </a:cxn>
+              <a:cxn ang="0">
+                <a:pos x="connsiteX10" y="connsiteY10"/>
+              </a:cxn>
+              <a:cxn ang="0">
+                <a:pos x="connsiteX11" y="connsiteY11"/>
+              </a:cxn>
+              <a:cxn ang="0">
+                <a:pos x="connsiteX12" y="connsiteY12"/>
+              </a:cxn>
+              <a:cxn ang="0">
+                <a:pos x="connsiteX13" y="connsiteY13"/>
+              </a:cxn>
+              <a:cxn ang="0">
+                <a:pos x="connsiteX14" y="connsiteY14"/>
+              </a:cxn>
+              <a:cxn ang="0">
+                <a:pos x="connsiteX15" y="connsiteY15"/>
+              </a:cxn>
+              <a:cxn ang="0">
+                <a:pos x="connsiteX16" y="connsiteY16"/>
+              </a:cxn>
+            </a:cxnLst>
+            <a:rect l="l" t="t" r="r" b="b"/>
+            <a:pathLst>
+              <a:path w="3977196" h="1332359" extrusionOk="0">
+                <a:moveTo>
+                  <a:pt x="0" y="0"/>
+                </a:moveTo>
+                <a:cubicBezTo>
+                  <a:pt x="288330" y="14418"/>
+                  <a:pt x="427840" y="-31252"/>
+                  <a:pt x="702638" y="0"/>
+                </a:cubicBezTo>
+                <a:cubicBezTo>
+                  <a:pt x="977436" y="31252"/>
+                  <a:pt x="1212926" y="19599"/>
+                  <a:pt x="1365504" y="0"/>
+                </a:cubicBezTo>
+                <a:cubicBezTo>
+                  <a:pt x="1518082" y="-19599"/>
+                  <a:pt x="1854984" y="84"/>
+                  <a:pt x="2028370" y="0"/>
+                </a:cubicBezTo>
+                <a:cubicBezTo>
+                  <a:pt x="2201756" y="-84"/>
+                  <a:pt x="2480966" y="24393"/>
+                  <a:pt x="2770780" y="0"/>
+                </a:cubicBezTo>
+                <a:cubicBezTo>
+                  <a:pt x="3060594" y="-24393"/>
+                  <a:pt x="3142808" y="7435"/>
+                  <a:pt x="3314330" y="0"/>
+                </a:cubicBezTo>
+                <a:cubicBezTo>
+                  <a:pt x="3485852" y="-7435"/>
+                  <a:pt x="3809760" y="-26147"/>
+                  <a:pt x="3977196" y="0"/>
+                </a:cubicBezTo>
+                <a:cubicBezTo>
+                  <a:pt x="3951680" y="286805"/>
+                  <a:pt x="4002905" y="419149"/>
+                  <a:pt x="3977196" y="639532"/>
+                </a:cubicBezTo>
+                <a:cubicBezTo>
+                  <a:pt x="3951487" y="859915"/>
+                  <a:pt x="4007684" y="1030093"/>
+                  <a:pt x="3977196" y="1332359"/>
+                </a:cubicBezTo>
+                <a:cubicBezTo>
+                  <a:pt x="3730988" y="1355519"/>
+                  <a:pt x="3558083" y="1329662"/>
+                  <a:pt x="3433646" y="1332359"/>
+                </a:cubicBezTo>
+                <a:cubicBezTo>
+                  <a:pt x="3309209" y="1335057"/>
+                  <a:pt x="3121530" y="1345430"/>
+                  <a:pt x="2890096" y="1332359"/>
+                </a:cubicBezTo>
+                <a:cubicBezTo>
+                  <a:pt x="2658662" y="1319289"/>
+                  <a:pt x="2380322" y="1363505"/>
+                  <a:pt x="2147686" y="1332359"/>
+                </a:cubicBezTo>
+                <a:cubicBezTo>
+                  <a:pt x="1915050" y="1301214"/>
+                  <a:pt x="1788820" y="1344039"/>
+                  <a:pt x="1604136" y="1332359"/>
+                </a:cubicBezTo>
+                <a:cubicBezTo>
+                  <a:pt x="1419452" y="1320680"/>
+                  <a:pt x="1041270" y="1309809"/>
+                  <a:pt x="861726" y="1332359"/>
+                </a:cubicBezTo>
+                <a:cubicBezTo>
+                  <a:pt x="682182" y="1354910"/>
+                  <a:pt x="238444" y="1334348"/>
+                  <a:pt x="0" y="1332359"/>
+                </a:cubicBezTo>
+                <a:cubicBezTo>
+                  <a:pt x="24261" y="1050855"/>
+                  <a:pt x="10174" y="901224"/>
+                  <a:pt x="0" y="706150"/>
+                </a:cubicBezTo>
+                <a:cubicBezTo>
+                  <a:pt x="-10174" y="511076"/>
+                  <a:pt x="-32160" y="145561"/>
+                  <a:pt x="0" y="0"/>
+                </a:cubicBezTo>
+                <a:close/>
+              </a:path>
+            </a:pathLst>
+          </a:custGeom>
+          <a:noFill/>
+          <a:ln w="28575">
+            <a:solidFill>
+              <a:schemeClr val="accent6">
+                <a:lumMod val="75000"/>
+              </a:schemeClr>
+            </a:solidFill>
+            <a:prstDash val="sysDash"/>
+            <a:extLst>
+              <a:ext uri="{C807C97D-BFC1-408E-A445-0C87EB9F89A2}">
+                <ask:lineSketchStyleProps xmlns:ask="http://schemas.microsoft.com/office/drawing/2018/sketchyshapes" sd="188121421">
+                  <a:prstGeom prst="rect">
+                    <a:avLst/>
+                  </a:prstGeom>
+                  <ask:type>
+                    <ask:lineSketchFreehand/>
+                  </ask:type>
+                </ask:lineSketchStyleProps>
+              </a:ext>
+            </a:extLst>
+          </a:ln>
+        </p:spPr>
+        <p:style>
+          <a:lnRef idx="2">
+            <a:schemeClr val="accent1">
+              <a:shade val="50000"/>
+            </a:schemeClr>
+          </a:lnRef>
+          <a:fillRef idx="1">
+            <a:schemeClr val="accent1"/>
+          </a:fillRef>
+          <a:effectRef idx="0">
+            <a:schemeClr val="accent1"/>
+          </a:effectRef>
+          <a:fontRef idx="minor">
+            <a:schemeClr val="lt1"/>
+          </a:fontRef>
+        </p:style>
+        <p:txBody>
+          <a:bodyPr rtlCol="0" anchor="ctr"/>
+          <a:lstStyle/>
+          <a:p>
+            <a:pPr algn="ctr"/>
+            <a:endParaRPr lang="zh-CN" altLang="en-US"/>
+          </a:p>
+        </p:txBody>
+      </p:sp>
+      <p:sp>
+        <p:nvSpPr>
+          <p:cNvPr id="15" name="文本框 14">
+            <a:extLst>
+              <a:ext uri="{FF2B5EF4-FFF2-40B4-BE49-F238E27FC236}">
+                <a16:creationId xmlns:a16="http://schemas.microsoft.com/office/drawing/2014/main" id="{8ECDABA5-F040-4391-B45D-B483B591DD38}"/>
+              </a:ext>
+            </a:extLst>
+          </p:cNvPr>
+          <p:cNvSpPr txBox="1"/>
+          <p:nvPr/>
+        </p:nvSpPr>
+        <p:spPr>
+          <a:xfrm>
+            <a:off x="7529130" y="1908685"/>
+            <a:ext cx="800219" cy="461665"/>
+          </a:xfrm>
+          <a:prstGeom prst="rect">
+            <a:avLst/>
+          </a:prstGeom>
+          <a:noFill/>
+        </p:spPr>
+        <p:txBody>
+          <a:bodyPr wrap="none" rtlCol="0">
+            <a:spAutoFit/>
+          </a:bodyPr>
+          <a:lstStyle/>
+          <a:p>
+            <a:r>
+              <a:rPr lang="zh-CN" altLang="en-US" sz="2400" dirty="0">
+                <a:solidFill>
+                  <a:schemeClr val="tx1">
+                    <a:lumMod val="50000"/>
+                    <a:lumOff val="50000"/>
+                  </a:schemeClr>
+                </a:solidFill>
+              </a:rPr>
+              <a:t>文字</a:t>
+            </a:r>
+          </a:p>
+        </p:txBody>
+      </p:sp>
+      <p:sp>
+        <p:nvSpPr>
+          <p:cNvPr id="16" name="文本框 15">
+            <a:extLst>
+              <a:ext uri="{FF2B5EF4-FFF2-40B4-BE49-F238E27FC236}">
+                <a16:creationId xmlns:a16="http://schemas.microsoft.com/office/drawing/2014/main" id="{6F61EA88-B037-4624-A2BA-30F9B47CB7F7}"/>
+              </a:ext>
+            </a:extLst>
+          </p:cNvPr>
+          <p:cNvSpPr txBox="1"/>
+          <p:nvPr/>
+        </p:nvSpPr>
+        <p:spPr>
+          <a:xfrm>
+            <a:off x="7539486" y="4461370"/>
+            <a:ext cx="800219" cy="461665"/>
+          </a:xfrm>
+          <a:prstGeom prst="rect">
+            <a:avLst/>
+          </a:prstGeom>
+          <a:noFill/>
+        </p:spPr>
+        <p:txBody>
+          <a:bodyPr wrap="none" rtlCol="0">
+            <a:spAutoFit/>
+          </a:bodyPr>
+          <a:lstStyle/>
+          <a:p>
+            <a:r>
+              <a:rPr lang="zh-CN" altLang="en-US" sz="2400" dirty="0">
+                <a:solidFill>
+                  <a:schemeClr val="tx1">
+                    <a:lumMod val="50000"/>
+                    <a:lumOff val="50000"/>
+                  </a:schemeClr>
+                </a:solidFill>
+              </a:rPr>
+              <a:t>文字</a:t>
+            </a:r>
+          </a:p>
+        </p:txBody>
+      </p:sp>
+      <p:sp>
+        <p:nvSpPr>
+          <p:cNvPr id="17" name="文本框 16">
+            <a:extLst>
+              <a:ext uri="{FF2B5EF4-FFF2-40B4-BE49-F238E27FC236}">
+                <a16:creationId xmlns:a16="http://schemas.microsoft.com/office/drawing/2014/main" id="{60475581-9E4D-4C66-947E-BB7B8BB47FB6}"/>
+              </a:ext>
+            </a:extLst>
+          </p:cNvPr>
+          <p:cNvSpPr txBox="1"/>
+          <p:nvPr/>
+        </p:nvSpPr>
+        <p:spPr>
+          <a:xfrm>
+            <a:off x="7539486" y="3185027"/>
+            <a:ext cx="800219" cy="461665"/>
+          </a:xfrm>
+          <a:prstGeom prst="rect">
+            <a:avLst/>
+          </a:prstGeom>
+          <a:noFill/>
+        </p:spPr>
+        <p:txBody>
+          <a:bodyPr wrap="none" rtlCol="0">
+            <a:spAutoFit/>
+          </a:bodyPr>
+          <a:lstStyle/>
+          <a:p>
+            <a:r>
+              <a:rPr lang="zh-CN" altLang="en-US" sz="2400" dirty="0">
+                <a:solidFill>
+                  <a:schemeClr val="tx1">
+                    <a:lumMod val="50000"/>
+                    <a:lumOff val="50000"/>
+                  </a:schemeClr>
+                </a:solidFill>
+              </a:rPr>
+              <a:t>图片</a:t>
+            </a:r>
+          </a:p>
+        </p:txBody>
+      </p:sp>
+      <p:sp>
+        <p:nvSpPr>
+          <p:cNvPr id="20" name="矩形 19">
+            <a:extLst>
+              <a:ext uri="{FF2B5EF4-FFF2-40B4-BE49-F238E27FC236}">
+                <a16:creationId xmlns:a16="http://schemas.microsoft.com/office/drawing/2014/main" id="{49594A58-9347-4E86-A8BB-CB347346A2D9}"/>
+              </a:ext>
+            </a:extLst>
+          </p:cNvPr>
+          <p:cNvSpPr/>
+          <p:nvPr/>
+        </p:nvSpPr>
+        <p:spPr>
+          <a:xfrm>
+            <a:off x="1189608" y="1671393"/>
+            <a:ext cx="3977196" cy="870011"/>
+          </a:xfrm>
+          <a:custGeom>
+            <a:avLst/>
+            <a:gdLst>
+              <a:gd name="connsiteX0" fmla="*/ 0 w 3977196"/>
+              <a:gd name="connsiteY0" fmla="*/ 0 h 870011"/>
+              <a:gd name="connsiteX1" fmla="*/ 702638 w 3977196"/>
+              <a:gd name="connsiteY1" fmla="*/ 0 h 870011"/>
+              <a:gd name="connsiteX2" fmla="*/ 1365504 w 3977196"/>
+              <a:gd name="connsiteY2" fmla="*/ 0 h 870011"/>
+              <a:gd name="connsiteX3" fmla="*/ 2028370 w 3977196"/>
+              <a:gd name="connsiteY3" fmla="*/ 0 h 870011"/>
+              <a:gd name="connsiteX4" fmla="*/ 2770780 w 3977196"/>
+              <a:gd name="connsiteY4" fmla="*/ 0 h 870011"/>
+              <a:gd name="connsiteX5" fmla="*/ 3314330 w 3977196"/>
+              <a:gd name="connsiteY5" fmla="*/ 0 h 870011"/>
+              <a:gd name="connsiteX6" fmla="*/ 3977196 w 3977196"/>
+              <a:gd name="connsiteY6" fmla="*/ 0 h 870011"/>
+              <a:gd name="connsiteX7" fmla="*/ 3977196 w 3977196"/>
+              <a:gd name="connsiteY7" fmla="*/ 417605 h 870011"/>
+              <a:gd name="connsiteX8" fmla="*/ 3977196 w 3977196"/>
+              <a:gd name="connsiteY8" fmla="*/ 870011 h 870011"/>
+              <a:gd name="connsiteX9" fmla="*/ 3433646 w 3977196"/>
+              <a:gd name="connsiteY9" fmla="*/ 870011 h 870011"/>
+              <a:gd name="connsiteX10" fmla="*/ 2890096 w 3977196"/>
+              <a:gd name="connsiteY10" fmla="*/ 870011 h 870011"/>
+              <a:gd name="connsiteX11" fmla="*/ 2147686 w 3977196"/>
+              <a:gd name="connsiteY11" fmla="*/ 870011 h 870011"/>
+              <a:gd name="connsiteX12" fmla="*/ 1604136 w 3977196"/>
+              <a:gd name="connsiteY12" fmla="*/ 870011 h 870011"/>
+              <a:gd name="connsiteX13" fmla="*/ 861726 w 3977196"/>
+              <a:gd name="connsiteY13" fmla="*/ 870011 h 870011"/>
+              <a:gd name="connsiteX14" fmla="*/ 0 w 3977196"/>
+              <a:gd name="connsiteY14" fmla="*/ 870011 h 870011"/>
+              <a:gd name="connsiteX15" fmla="*/ 0 w 3977196"/>
+              <a:gd name="connsiteY15" fmla="*/ 461106 h 870011"/>
+              <a:gd name="connsiteX16" fmla="*/ 0 w 3977196"/>
+              <a:gd name="connsiteY16" fmla="*/ 0 h 870011"/>
+            </a:gdLst>
+            <a:ahLst/>
+            <a:cxnLst>
+              <a:cxn ang="0">
+                <a:pos x="connsiteX0" y="connsiteY0"/>
+              </a:cxn>
+              <a:cxn ang="0">
+                <a:pos x="connsiteX1" y="connsiteY1"/>
+              </a:cxn>
+              <a:cxn ang="0">
+                <a:pos x="connsiteX2" y="connsiteY2"/>
+              </a:cxn>
+              <a:cxn ang="0">
+                <a:pos x="connsiteX3" y="connsiteY3"/>
+              </a:cxn>
+              <a:cxn ang="0">
+                <a:pos x="connsiteX4" y="connsiteY4"/>
+              </a:cxn>
+              <a:cxn ang="0">
+                <a:pos x="connsiteX5" y="connsiteY5"/>
+              </a:cxn>
+              <a:cxn ang="0">
+                <a:pos x="connsiteX6" y="connsiteY6"/>
+              </a:cxn>
+              <a:cxn ang="0">
+                <a:pos x="connsiteX7" y="connsiteY7"/>
+              </a:cxn>
+              <a:cxn ang="0">
+                <a:pos x="connsiteX8" y="connsiteY8"/>
+              </a:cxn>
+              <a:cxn ang="0">
+                <a:pos x="connsiteX9" y="connsiteY9"/>
+              </a:cxn>
+              <a:cxn ang="0">
+                <a:pos x="connsiteX10" y="connsiteY10"/>
+              </a:cxn>
+              <a:cxn ang="0">
+                <a:pos x="connsiteX11" y="connsiteY11"/>
+              </a:cxn>
+              <a:cxn ang="0">
+                <a:pos x="connsiteX12" y="connsiteY12"/>
+              </a:cxn>
+              <a:cxn ang="0">
+                <a:pos x="connsiteX13" y="connsiteY13"/>
+              </a:cxn>
+              <a:cxn ang="0">
+                <a:pos x="connsiteX14" y="connsiteY14"/>
+              </a:cxn>
+              <a:cxn ang="0">
+                <a:pos x="connsiteX15" y="connsiteY15"/>
+              </a:cxn>
+              <a:cxn ang="0">
+                <a:pos x="connsiteX16" y="connsiteY16"/>
+              </a:cxn>
+            </a:cxnLst>
+            <a:rect l="l" t="t" r="r" b="b"/>
+            <a:pathLst>
+              <a:path w="3977196" h="870011" extrusionOk="0">
+                <a:moveTo>
+                  <a:pt x="0" y="0"/>
+                </a:moveTo>
+                <a:cubicBezTo>
+                  <a:pt x="288330" y="14418"/>
+                  <a:pt x="427840" y="-31252"/>
+                  <a:pt x="702638" y="0"/>
+                </a:cubicBezTo>
+                <a:cubicBezTo>
+                  <a:pt x="977436" y="31252"/>
+                  <a:pt x="1212926" y="19599"/>
+                  <a:pt x="1365504" y="0"/>
+                </a:cubicBezTo>
+                <a:cubicBezTo>
+                  <a:pt x="1518082" y="-19599"/>
+                  <a:pt x="1854984" y="84"/>
+                  <a:pt x="2028370" y="0"/>
+                </a:cubicBezTo>
+                <a:cubicBezTo>
+                  <a:pt x="2201756" y="-84"/>
+                  <a:pt x="2480966" y="24393"/>
+                  <a:pt x="2770780" y="0"/>
+                </a:cubicBezTo>
+                <a:cubicBezTo>
+                  <a:pt x="3060594" y="-24393"/>
+                  <a:pt x="3142808" y="7435"/>
+                  <a:pt x="3314330" y="0"/>
+                </a:cubicBezTo>
+                <a:cubicBezTo>
+                  <a:pt x="3485852" y="-7435"/>
+                  <a:pt x="3809760" y="-26147"/>
+                  <a:pt x="3977196" y="0"/>
+                </a:cubicBezTo>
+                <a:cubicBezTo>
+                  <a:pt x="3968352" y="148965"/>
+                  <a:pt x="3958213" y="254262"/>
+                  <a:pt x="3977196" y="417605"/>
+                </a:cubicBezTo>
+                <a:cubicBezTo>
+                  <a:pt x="3996179" y="580948"/>
+                  <a:pt x="3973321" y="747097"/>
+                  <a:pt x="3977196" y="870011"/>
+                </a:cubicBezTo>
+                <a:cubicBezTo>
+                  <a:pt x="3730988" y="893171"/>
+                  <a:pt x="3558083" y="867314"/>
+                  <a:pt x="3433646" y="870011"/>
+                </a:cubicBezTo>
+                <a:cubicBezTo>
+                  <a:pt x="3309209" y="872709"/>
+                  <a:pt x="3121530" y="883082"/>
+                  <a:pt x="2890096" y="870011"/>
+                </a:cubicBezTo>
+                <a:cubicBezTo>
+                  <a:pt x="2658662" y="856941"/>
+                  <a:pt x="2380322" y="901157"/>
+                  <a:pt x="2147686" y="870011"/>
+                </a:cubicBezTo>
+                <a:cubicBezTo>
+                  <a:pt x="1915050" y="838866"/>
+                  <a:pt x="1788820" y="881691"/>
+                  <a:pt x="1604136" y="870011"/>
+                </a:cubicBezTo>
+                <a:cubicBezTo>
+                  <a:pt x="1419452" y="858332"/>
+                  <a:pt x="1041270" y="847461"/>
+                  <a:pt x="861726" y="870011"/>
+                </a:cubicBezTo>
+                <a:cubicBezTo>
+                  <a:pt x="682182" y="892562"/>
+                  <a:pt x="238444" y="872000"/>
+                  <a:pt x="0" y="870011"/>
+                </a:cubicBezTo>
+                <a:cubicBezTo>
+                  <a:pt x="9039" y="719391"/>
+                  <a:pt x="-11052" y="546301"/>
+                  <a:pt x="0" y="461106"/>
+                </a:cubicBezTo>
+                <a:cubicBezTo>
+                  <a:pt x="11052" y="375912"/>
+                  <a:pt x="9697" y="162931"/>
+                  <a:pt x="0" y="0"/>
+                </a:cubicBezTo>
+                <a:close/>
+              </a:path>
+            </a:pathLst>
+          </a:custGeom>
+          <a:noFill/>
+          <a:ln w="28575">
+            <a:solidFill>
+              <a:schemeClr val="accent2"/>
+            </a:solidFill>
+            <a:prstDash val="sysDash"/>
+            <a:extLst>
+              <a:ext uri="{C807C97D-BFC1-408E-A445-0C87EB9F89A2}">
+                <ask:lineSketchStyleProps xmlns:ask="http://schemas.microsoft.com/office/drawing/2018/sketchyshapes" sd="188121421">
+                  <a:prstGeom prst="rect">
+                    <a:avLst/>
+                  </a:prstGeom>
+                  <ask:type>
+                    <ask:lineSketchFreehand/>
+                  </ask:type>
+                </ask:lineSketchStyleProps>
+              </a:ext>
+            </a:extLst>
+          </a:ln>
+        </p:spPr>
+        <p:style>
+          <a:lnRef idx="2">
+            <a:schemeClr val="accent1">
+              <a:shade val="50000"/>
+            </a:schemeClr>
+          </a:lnRef>
+          <a:fillRef idx="1">
+            <a:schemeClr val="accent1"/>
+          </a:fillRef>
+          <a:effectRef idx="0">
+            <a:schemeClr val="accent1"/>
+          </a:effectRef>
+          <a:fontRef idx="minor">
+            <a:schemeClr val="lt1"/>
+          </a:fontRef>
+        </p:style>
+        <p:txBody>
+          <a:bodyPr rtlCol="0" anchor="ctr"/>
+          <a:lstStyle/>
+          <a:p>
+            <a:pPr algn="ctr"/>
+            <a:endParaRPr lang="zh-CN" altLang="en-US"/>
+          </a:p>
+        </p:txBody>
+      </p:sp>
+      <p:sp>
+        <p:nvSpPr>
+          <p:cNvPr id="21" name="文本框 20">
+            <a:extLst>
+              <a:ext uri="{FF2B5EF4-FFF2-40B4-BE49-F238E27FC236}">
+                <a16:creationId xmlns:a16="http://schemas.microsoft.com/office/drawing/2014/main" id="{DC142D13-714C-4F4E-960A-CE408A48CDB4}"/>
+              </a:ext>
+            </a:extLst>
+          </p:cNvPr>
+          <p:cNvSpPr txBox="1"/>
+          <p:nvPr/>
+        </p:nvSpPr>
+        <p:spPr>
+          <a:xfrm>
+            <a:off x="2778096" y="1875565"/>
+            <a:ext cx="800219" cy="461665"/>
+          </a:xfrm>
+          <a:prstGeom prst="rect">
+            <a:avLst/>
+          </a:prstGeom>
+          <a:noFill/>
+        </p:spPr>
+        <p:txBody>
+          <a:bodyPr wrap="none" rtlCol="0">
+            <a:spAutoFit/>
+          </a:bodyPr>
+          <a:lstStyle/>
+          <a:p>
+            <a:r>
+              <a:rPr lang="zh-CN" altLang="en-US" sz="2400" dirty="0">
+                <a:solidFill>
+                  <a:schemeClr val="tx1">
+                    <a:lumMod val="50000"/>
+                    <a:lumOff val="50000"/>
+                  </a:schemeClr>
+                </a:solidFill>
+              </a:rPr>
+              <a:t>文字</a:t>
+            </a:r>
+          </a:p>
+        </p:txBody>
+      </p:sp>
+    </p:spTree>
+    <p:extLst>
+      <p:ext uri="{BB962C8B-B14F-4D97-AF65-F5344CB8AC3E}">
+        <p14:creationId xmlns:p14="http://schemas.microsoft.com/office/powerpoint/2010/main" val="646788489"/>
+      </p:ext>
+    </p:extLst>
+  </p:cSld>
+  <p:clrMapOvr>
+    <a:masterClrMapping/>
+  </p:clrMapOvr>
+</p:sld>
+</file>
+
+<file path=ppt/slides/slide3.xml><?xml version="1.0" encoding="utf-8"?>
+<p:sld xmlns:a="http://schemas.openxmlformats.org/drawingml/2006/main" xmlns:r="http://schemas.openxmlformats.org/officeDocument/2006/relationships" xmlns:p="http://schemas.openxmlformats.org/presentationml/2006/main">
+  <p:cSld>
+    <p:spTree>
+      <p:nvGrpSpPr>
+        <p:cNvPr id="1" name=""/>
+        <p:cNvGrpSpPr/>
+        <p:nvPr/>
+      </p:nvGrpSpPr>
+      <p:grpSpPr>
+        <a:xfrm>
+          <a:off x="0" y="0"/>
+          <a:ext cx="0" cy="0"/>
+          <a:chOff x="0" y="0"/>
+          <a:chExt cx="0" cy="0"/>
+        </a:xfrm>
+      </p:grpSpPr>
+      <p:pic>
+        <p:nvPicPr>
+          <p:cNvPr id="5" name="图片 4">
+            <a:extLst>
+              <a:ext uri="{FF2B5EF4-FFF2-40B4-BE49-F238E27FC236}">
+                <a16:creationId xmlns:a16="http://schemas.microsoft.com/office/drawing/2014/main" id="{A40A6086-E590-46F6-960E-0A5494C758FF}"/>
+              </a:ext>
+            </a:extLst>
+          </p:cNvPr>
+          <p:cNvPicPr>
+            <a:picLocks noChangeAspect="1"/>
+          </p:cNvPicPr>
+          <p:nvPr/>
+        </p:nvPicPr>
+        <p:blipFill>
+          <a:blip r:embed="rId2">
+            <a:extLst>
+              <a:ext uri="{28A0092B-C50C-407E-A947-70E740481C1C}">
+                <a14:useLocalDpi xmlns:a14="http://schemas.microsoft.com/office/drawing/2010/main" val="0"/>
+              </a:ext>
+            </a:extLst>
+          </a:blip>
+          <a:stretch>
+            <a:fillRect/>
+          </a:stretch>
+        </p:blipFill>
+        <p:spPr>
+          <a:xfrm>
+            <a:off x="859257" y="2787617"/>
+            <a:ext cx="4667490" cy="1282766"/>
+          </a:xfrm>
+          <a:prstGeom prst="rect">
+            <a:avLst/>
+          </a:prstGeom>
+        </p:spPr>
+      </p:pic>
+      <p:pic>
+        <p:nvPicPr>
+          <p:cNvPr id="7" name="图片 6">
+            <a:extLst>
+              <a:ext uri="{FF2B5EF4-FFF2-40B4-BE49-F238E27FC236}">
+                <a16:creationId xmlns:a16="http://schemas.microsoft.com/office/drawing/2014/main" id="{8DF93869-4B35-4761-97D3-7F5B649B4123}"/>
+              </a:ext>
+            </a:extLst>
+          </p:cNvPr>
+          <p:cNvPicPr>
+            <a:picLocks noChangeAspect="1"/>
+          </p:cNvPicPr>
+          <p:nvPr/>
+        </p:nvPicPr>
+        <p:blipFill>
+          <a:blip r:embed="rId3">
+            <a:extLst>
+              <a:ext uri="{28A0092B-C50C-407E-A947-70E740481C1C}">
+                <a14:useLocalDpi xmlns:a14="http://schemas.microsoft.com/office/drawing/2010/main" val="0"/>
+              </a:ext>
+            </a:extLst>
+          </a:blip>
+          <a:stretch>
+            <a:fillRect/>
+          </a:stretch>
+        </p:blipFill>
+        <p:spPr>
+          <a:xfrm>
+            <a:off x="6069367" y="2636696"/>
+            <a:ext cx="4064209" cy="1809843"/>
+          </a:xfrm>
+          <a:prstGeom prst="rect">
+            <a:avLst/>
+          </a:prstGeom>
+        </p:spPr>
+      </p:pic>
+    </p:spTree>
+    <p:extLst>
+      <p:ext uri="{BB962C8B-B14F-4D97-AF65-F5344CB8AC3E}">
+        <p14:creationId xmlns:p14="http://schemas.microsoft.com/office/powerpoint/2010/main" val="689558076"/>
+      </p:ext>
+    </p:extLst>
+  </p:cSld>
+  <p:clrMapOvr>
+    <a:masterClrMapping/>
+  </p:clrMapOvr>
+</p:sld>
+</file>
+
 <file path=ppt/theme/theme1.xml><?xml version="1.0" encoding="utf-8"?>
 <a:theme xmlns:a="http://schemas.openxmlformats.org/drawingml/2006/main" name="Office 主题​​">
   <a:themeElements>

</xml_diff>

<commit_message>
Site updated: 2024-08-02 14:36:52
</commit_message>
<xml_diff>
--- a/asset/舒适写作大法/figure.pptx
+++ b/asset/舒适写作大法/figure.pptx
@@ -8,6 +8,9 @@
     <p:sldId id="256" r:id="rId2"/>
     <p:sldId id="257" r:id="rId3"/>
     <p:sldId id="258" r:id="rId4"/>
+    <p:sldId id="259" r:id="rId5"/>
+    <p:sldId id="261" r:id="rId6"/>
+    <p:sldId id="260" r:id="rId7"/>
   </p:sldIdLst>
   <p:sldSz cx="12192000" cy="6858000"/>
   <p:notesSz cx="6858000" cy="9144000"/>
@@ -261,7 +264,7 @@
           <a:p>
             <a:fld id="{E62BEFD4-20EB-4A6A-A610-85E2DAC37D91}" type="datetimeFigureOut">
               <a:rPr lang="zh-CN" altLang="en-US" smtClean="0"/>
-              <a:t>2024/05/11</a:t>
+              <a:t>2024/08/02</a:t>
             </a:fld>
             <a:endParaRPr lang="zh-CN" altLang="en-US"/>
           </a:p>
@@ -459,7 +462,7 @@
           <a:p>
             <a:fld id="{E62BEFD4-20EB-4A6A-A610-85E2DAC37D91}" type="datetimeFigureOut">
               <a:rPr lang="zh-CN" altLang="en-US" smtClean="0"/>
-              <a:t>2024/05/11</a:t>
+              <a:t>2024/08/02</a:t>
             </a:fld>
             <a:endParaRPr lang="zh-CN" altLang="en-US"/>
           </a:p>
@@ -667,7 +670,7 @@
           <a:p>
             <a:fld id="{E62BEFD4-20EB-4A6A-A610-85E2DAC37D91}" type="datetimeFigureOut">
               <a:rPr lang="zh-CN" altLang="en-US" smtClean="0"/>
-              <a:t>2024/05/11</a:t>
+              <a:t>2024/08/02</a:t>
             </a:fld>
             <a:endParaRPr lang="zh-CN" altLang="en-US"/>
           </a:p>
@@ -865,7 +868,7 @@
           <a:p>
             <a:fld id="{E62BEFD4-20EB-4A6A-A610-85E2DAC37D91}" type="datetimeFigureOut">
               <a:rPr lang="zh-CN" altLang="en-US" smtClean="0"/>
-              <a:t>2024/05/11</a:t>
+              <a:t>2024/08/02</a:t>
             </a:fld>
             <a:endParaRPr lang="zh-CN" altLang="en-US"/>
           </a:p>
@@ -1140,7 +1143,7 @@
           <a:p>
             <a:fld id="{E62BEFD4-20EB-4A6A-A610-85E2DAC37D91}" type="datetimeFigureOut">
               <a:rPr lang="zh-CN" altLang="en-US" smtClean="0"/>
-              <a:t>2024/05/11</a:t>
+              <a:t>2024/08/02</a:t>
             </a:fld>
             <a:endParaRPr lang="zh-CN" altLang="en-US"/>
           </a:p>
@@ -1405,7 +1408,7 @@
           <a:p>
             <a:fld id="{E62BEFD4-20EB-4A6A-A610-85E2DAC37D91}" type="datetimeFigureOut">
               <a:rPr lang="zh-CN" altLang="en-US" smtClean="0"/>
-              <a:t>2024/05/11</a:t>
+              <a:t>2024/08/02</a:t>
             </a:fld>
             <a:endParaRPr lang="zh-CN" altLang="en-US"/>
           </a:p>
@@ -1817,7 +1820,7 @@
           <a:p>
             <a:fld id="{E62BEFD4-20EB-4A6A-A610-85E2DAC37D91}" type="datetimeFigureOut">
               <a:rPr lang="zh-CN" altLang="en-US" smtClean="0"/>
-              <a:t>2024/05/11</a:t>
+              <a:t>2024/08/02</a:t>
             </a:fld>
             <a:endParaRPr lang="zh-CN" altLang="en-US"/>
           </a:p>
@@ -1958,7 +1961,7 @@
           <a:p>
             <a:fld id="{E62BEFD4-20EB-4A6A-A610-85E2DAC37D91}" type="datetimeFigureOut">
               <a:rPr lang="zh-CN" altLang="en-US" smtClean="0"/>
-              <a:t>2024/05/11</a:t>
+              <a:t>2024/08/02</a:t>
             </a:fld>
             <a:endParaRPr lang="zh-CN" altLang="en-US"/>
           </a:p>
@@ -2071,7 +2074,7 @@
           <a:p>
             <a:fld id="{E62BEFD4-20EB-4A6A-A610-85E2DAC37D91}" type="datetimeFigureOut">
               <a:rPr lang="zh-CN" altLang="en-US" smtClean="0"/>
-              <a:t>2024/05/11</a:t>
+              <a:t>2024/08/02</a:t>
             </a:fld>
             <a:endParaRPr lang="zh-CN" altLang="en-US"/>
           </a:p>
@@ -2382,7 +2385,7 @@
           <a:p>
             <a:fld id="{E62BEFD4-20EB-4A6A-A610-85E2DAC37D91}" type="datetimeFigureOut">
               <a:rPr lang="zh-CN" altLang="en-US" smtClean="0"/>
-              <a:t>2024/05/11</a:t>
+              <a:t>2024/08/02</a:t>
             </a:fld>
             <a:endParaRPr lang="zh-CN" altLang="en-US"/>
           </a:p>
@@ -2670,7 +2673,7 @@
           <a:p>
             <a:fld id="{E62BEFD4-20EB-4A6A-A610-85E2DAC37D91}" type="datetimeFigureOut">
               <a:rPr lang="zh-CN" altLang="en-US" smtClean="0"/>
-              <a:t>2024/05/11</a:t>
+              <a:t>2024/08/02</a:t>
             </a:fld>
             <a:endParaRPr lang="zh-CN" altLang="en-US"/>
           </a:p>
@@ -2911,7 +2914,7 @@
           <a:p>
             <a:fld id="{E62BEFD4-20EB-4A6A-A610-85E2DAC37D91}" type="datetimeFigureOut">
               <a:rPr lang="zh-CN" altLang="en-US" smtClean="0"/>
-              <a:t>2024/05/11</a:t>
+              <a:t>2024/08/02</a:t>
             </a:fld>
             <a:endParaRPr lang="zh-CN" altLang="en-US"/>
           </a:p>
@@ -5995,6 +5998,472 @@
 </p:sld>
 </file>
 
+<file path=ppt/slides/slide4.xml><?xml version="1.0" encoding="utf-8"?>
+<p:sld xmlns:a="http://schemas.openxmlformats.org/drawingml/2006/main" xmlns:r="http://schemas.openxmlformats.org/officeDocument/2006/relationships" xmlns:p="http://schemas.openxmlformats.org/presentationml/2006/main">
+  <p:cSld>
+    <p:spTree>
+      <p:nvGrpSpPr>
+        <p:cNvPr id="1" name=""/>
+        <p:cNvGrpSpPr/>
+        <p:nvPr/>
+      </p:nvGrpSpPr>
+      <p:grpSpPr>
+        <a:xfrm>
+          <a:off x="0" y="0"/>
+          <a:ext cx="0" cy="0"/>
+          <a:chOff x="0" y="0"/>
+          <a:chExt cx="0" cy="0"/>
+        </a:xfrm>
+      </p:grpSpPr>
+      <p:pic>
+        <p:nvPicPr>
+          <p:cNvPr id="5" name="图片 4">
+            <a:extLst>
+              <a:ext uri="{FF2B5EF4-FFF2-40B4-BE49-F238E27FC236}">
+                <a16:creationId xmlns:a16="http://schemas.microsoft.com/office/drawing/2014/main" id="{889DDD54-4367-4319-9044-0B28C7814A9A}"/>
+              </a:ext>
+            </a:extLst>
+          </p:cNvPr>
+          <p:cNvPicPr>
+            <a:picLocks noChangeAspect="1"/>
+          </p:cNvPicPr>
+          <p:nvPr/>
+        </p:nvPicPr>
+        <p:blipFill>
+          <a:blip r:embed="rId2"/>
+          <a:stretch>
+            <a:fillRect/>
+          </a:stretch>
+        </p:blipFill>
+        <p:spPr>
+          <a:xfrm>
+            <a:off x="5586858" y="2452549"/>
+            <a:ext cx="1733792" cy="1952898"/>
+          </a:xfrm>
+          <a:prstGeom prst="rect">
+            <a:avLst/>
+          </a:prstGeom>
+        </p:spPr>
+      </p:pic>
+      <p:pic>
+        <p:nvPicPr>
+          <p:cNvPr id="7" name="图片 6">
+            <a:extLst>
+              <a:ext uri="{FF2B5EF4-FFF2-40B4-BE49-F238E27FC236}">
+                <a16:creationId xmlns:a16="http://schemas.microsoft.com/office/drawing/2014/main" id="{AF7A4AF0-7F5E-49BE-B032-30E56B4F7172}"/>
+              </a:ext>
+            </a:extLst>
+          </p:cNvPr>
+          <p:cNvPicPr>
+            <a:picLocks noChangeAspect="1"/>
+          </p:cNvPicPr>
+          <p:nvPr/>
+        </p:nvPicPr>
+        <p:blipFill>
+          <a:blip r:embed="rId3"/>
+          <a:stretch>
+            <a:fillRect/>
+          </a:stretch>
+        </p:blipFill>
+        <p:spPr>
+          <a:xfrm>
+            <a:off x="3190929" y="2571629"/>
+            <a:ext cx="1810003" cy="1714739"/>
+          </a:xfrm>
+          <a:prstGeom prst="rect">
+            <a:avLst/>
+          </a:prstGeom>
+        </p:spPr>
+      </p:pic>
+      <p:sp>
+        <p:nvSpPr>
+          <p:cNvPr id="8" name="文本框 7">
+            <a:extLst>
+              <a:ext uri="{FF2B5EF4-FFF2-40B4-BE49-F238E27FC236}">
+                <a16:creationId xmlns:a16="http://schemas.microsoft.com/office/drawing/2014/main" id="{516142CA-DCBE-46B0-AC6F-697BEFC0AEF7}"/>
+              </a:ext>
+            </a:extLst>
+          </p:cNvPr>
+          <p:cNvSpPr txBox="1"/>
+          <p:nvPr/>
+        </p:nvSpPr>
+        <p:spPr>
+          <a:xfrm>
+            <a:off x="3663760" y="4634143"/>
+            <a:ext cx="864339" cy="369332"/>
+          </a:xfrm>
+          <a:prstGeom prst="rect">
+            <a:avLst/>
+          </a:prstGeom>
+          <a:noFill/>
+        </p:spPr>
+        <p:txBody>
+          <a:bodyPr wrap="none" rtlCol="0">
+            <a:spAutoFit/>
+          </a:bodyPr>
+          <a:lstStyle/>
+          <a:p>
+            <a:r>
+              <a:rPr lang="en-US" altLang="zh-CN" dirty="0" err="1"/>
+              <a:t>Github</a:t>
+            </a:r>
+            <a:endParaRPr lang="zh-CN" altLang="en-US" dirty="0"/>
+          </a:p>
+        </p:txBody>
+      </p:sp>
+      <p:sp>
+        <p:nvSpPr>
+          <p:cNvPr id="9" name="文本框 8">
+            <a:extLst>
+              <a:ext uri="{FF2B5EF4-FFF2-40B4-BE49-F238E27FC236}">
+                <a16:creationId xmlns:a16="http://schemas.microsoft.com/office/drawing/2014/main" id="{E225CDAA-92B4-413C-BD0D-78951AC46987}"/>
+              </a:ext>
+            </a:extLst>
+          </p:cNvPr>
+          <p:cNvSpPr txBox="1"/>
+          <p:nvPr/>
+        </p:nvSpPr>
+        <p:spPr>
+          <a:xfrm>
+            <a:off x="5720220" y="4634143"/>
+            <a:ext cx="1467068" cy="369332"/>
+          </a:xfrm>
+          <a:prstGeom prst="rect">
+            <a:avLst/>
+          </a:prstGeom>
+          <a:noFill/>
+        </p:spPr>
+        <p:txBody>
+          <a:bodyPr wrap="none" rtlCol="0">
+            <a:spAutoFit/>
+          </a:bodyPr>
+          <a:lstStyle/>
+          <a:p>
+            <a:r>
+              <a:rPr lang="en-US" altLang="zh-CN" dirty="0" err="1"/>
+              <a:t>Github</a:t>
+            </a:r>
+            <a:r>
+              <a:rPr lang="en-US" altLang="zh-CN" dirty="0"/>
+              <a:t> Night</a:t>
+            </a:r>
+            <a:endParaRPr lang="zh-CN" altLang="en-US" dirty="0"/>
+          </a:p>
+        </p:txBody>
+      </p:sp>
+    </p:spTree>
+    <p:extLst>
+      <p:ext uri="{BB962C8B-B14F-4D97-AF65-F5344CB8AC3E}">
+        <p14:creationId xmlns:p14="http://schemas.microsoft.com/office/powerpoint/2010/main" val="3451440992"/>
+      </p:ext>
+    </p:extLst>
+  </p:cSld>
+  <p:clrMapOvr>
+    <a:masterClrMapping/>
+  </p:clrMapOvr>
+</p:sld>
+</file>
+
+<file path=ppt/slides/slide5.xml><?xml version="1.0" encoding="utf-8"?>
+<p:sld xmlns:a="http://schemas.openxmlformats.org/drawingml/2006/main" xmlns:r="http://schemas.openxmlformats.org/officeDocument/2006/relationships" xmlns:p="http://schemas.openxmlformats.org/presentationml/2006/main">
+  <p:cSld>
+    <p:spTree>
+      <p:nvGrpSpPr>
+        <p:cNvPr id="1" name=""/>
+        <p:cNvGrpSpPr/>
+        <p:nvPr/>
+      </p:nvGrpSpPr>
+      <p:grpSpPr>
+        <a:xfrm>
+          <a:off x="0" y="0"/>
+          <a:ext cx="0" cy="0"/>
+          <a:chOff x="0" y="0"/>
+          <a:chExt cx="0" cy="0"/>
+        </a:xfrm>
+      </p:grpSpPr>
+      <p:pic>
+        <p:nvPicPr>
+          <p:cNvPr id="5" name="图片 4">
+            <a:extLst>
+              <a:ext uri="{FF2B5EF4-FFF2-40B4-BE49-F238E27FC236}">
+                <a16:creationId xmlns:a16="http://schemas.microsoft.com/office/drawing/2014/main" id="{540EA025-F66A-4E53-9C3E-13AE8C684A7F}"/>
+              </a:ext>
+            </a:extLst>
+          </p:cNvPr>
+          <p:cNvPicPr>
+            <a:picLocks noChangeAspect="1"/>
+          </p:cNvPicPr>
+          <p:nvPr/>
+        </p:nvPicPr>
+        <p:blipFill>
+          <a:blip r:embed="rId2"/>
+          <a:stretch>
+            <a:fillRect/>
+          </a:stretch>
+        </p:blipFill>
+        <p:spPr>
+          <a:xfrm>
+            <a:off x="213090" y="1771095"/>
+            <a:ext cx="5431178" cy="3315809"/>
+          </a:xfrm>
+          <a:prstGeom prst="rect">
+            <a:avLst/>
+          </a:prstGeom>
+        </p:spPr>
+      </p:pic>
+      <p:pic>
+        <p:nvPicPr>
+          <p:cNvPr id="7" name="图片 6">
+            <a:extLst>
+              <a:ext uri="{FF2B5EF4-FFF2-40B4-BE49-F238E27FC236}">
+                <a16:creationId xmlns:a16="http://schemas.microsoft.com/office/drawing/2014/main" id="{C4FD3B7E-4690-4CB7-9590-C3873FCE7D01}"/>
+              </a:ext>
+            </a:extLst>
+          </p:cNvPr>
+          <p:cNvPicPr>
+            <a:picLocks noChangeAspect="1"/>
+          </p:cNvPicPr>
+          <p:nvPr/>
+        </p:nvPicPr>
+        <p:blipFill>
+          <a:blip r:embed="rId3"/>
+          <a:stretch>
+            <a:fillRect/>
+          </a:stretch>
+        </p:blipFill>
+        <p:spPr>
+          <a:xfrm>
+            <a:off x="5644268" y="1771095"/>
+            <a:ext cx="5431179" cy="3315810"/>
+          </a:xfrm>
+          <a:prstGeom prst="rect">
+            <a:avLst/>
+          </a:prstGeom>
+        </p:spPr>
+      </p:pic>
+    </p:spTree>
+    <p:extLst>
+      <p:ext uri="{BB962C8B-B14F-4D97-AF65-F5344CB8AC3E}">
+        <p14:creationId xmlns:p14="http://schemas.microsoft.com/office/powerpoint/2010/main" val="511406774"/>
+      </p:ext>
+    </p:extLst>
+  </p:cSld>
+  <p:clrMapOvr>
+    <a:masterClrMapping/>
+  </p:clrMapOvr>
+</p:sld>
+</file>
+
+<file path=ppt/slides/slide6.xml><?xml version="1.0" encoding="utf-8"?>
+<p:sld xmlns:a="http://schemas.openxmlformats.org/drawingml/2006/main" xmlns:r="http://schemas.openxmlformats.org/officeDocument/2006/relationships" xmlns:p="http://schemas.openxmlformats.org/presentationml/2006/main">
+  <p:cSld>
+    <p:spTree>
+      <p:nvGrpSpPr>
+        <p:cNvPr id="1" name=""/>
+        <p:cNvGrpSpPr/>
+        <p:nvPr/>
+      </p:nvGrpSpPr>
+      <p:grpSpPr>
+        <a:xfrm>
+          <a:off x="0" y="0"/>
+          <a:ext cx="0" cy="0"/>
+          <a:chOff x="0" y="0"/>
+          <a:chExt cx="0" cy="0"/>
+        </a:xfrm>
+      </p:grpSpPr>
+      <p:pic>
+        <p:nvPicPr>
+          <p:cNvPr id="5" name="图片 4">
+            <a:extLst>
+              <a:ext uri="{FF2B5EF4-FFF2-40B4-BE49-F238E27FC236}">
+                <a16:creationId xmlns:a16="http://schemas.microsoft.com/office/drawing/2014/main" id="{321A9075-992F-4156-A5C4-F988E7227EAE}"/>
+              </a:ext>
+            </a:extLst>
+          </p:cNvPr>
+          <p:cNvPicPr>
+            <a:picLocks noChangeAspect="1"/>
+          </p:cNvPicPr>
+          <p:nvPr/>
+        </p:nvPicPr>
+        <p:blipFill>
+          <a:blip r:embed="rId2"/>
+          <a:stretch>
+            <a:fillRect/>
+          </a:stretch>
+        </p:blipFill>
+        <p:spPr>
+          <a:xfrm>
+            <a:off x="577049" y="981673"/>
+            <a:ext cx="3604333" cy="2200971"/>
+          </a:xfrm>
+          <a:prstGeom prst="rect">
+            <a:avLst/>
+          </a:prstGeom>
+        </p:spPr>
+      </p:pic>
+      <p:pic>
+        <p:nvPicPr>
+          <p:cNvPr id="7" name="图片 6">
+            <a:extLst>
+              <a:ext uri="{FF2B5EF4-FFF2-40B4-BE49-F238E27FC236}">
+                <a16:creationId xmlns:a16="http://schemas.microsoft.com/office/drawing/2014/main" id="{3AC758E9-87A9-4F5F-9E73-E55A4D7D8804}"/>
+              </a:ext>
+            </a:extLst>
+          </p:cNvPr>
+          <p:cNvPicPr>
+            <a:picLocks noChangeAspect="1"/>
+          </p:cNvPicPr>
+          <p:nvPr/>
+        </p:nvPicPr>
+        <p:blipFill>
+          <a:blip r:embed="rId3"/>
+          <a:stretch>
+            <a:fillRect/>
+          </a:stretch>
+        </p:blipFill>
+        <p:spPr>
+          <a:xfrm>
+            <a:off x="4181382" y="981674"/>
+            <a:ext cx="3604333" cy="2200972"/>
+          </a:xfrm>
+          <a:prstGeom prst="rect">
+            <a:avLst/>
+          </a:prstGeom>
+        </p:spPr>
+      </p:pic>
+      <p:pic>
+        <p:nvPicPr>
+          <p:cNvPr id="9" name="图片 8">
+            <a:extLst>
+              <a:ext uri="{FF2B5EF4-FFF2-40B4-BE49-F238E27FC236}">
+                <a16:creationId xmlns:a16="http://schemas.microsoft.com/office/drawing/2014/main" id="{F92CADE6-E674-4C92-8C73-6596DB9F5823}"/>
+              </a:ext>
+            </a:extLst>
+          </p:cNvPr>
+          <p:cNvPicPr>
+            <a:picLocks noChangeAspect="1"/>
+          </p:cNvPicPr>
+          <p:nvPr/>
+        </p:nvPicPr>
+        <p:blipFill>
+          <a:blip r:embed="rId4"/>
+          <a:stretch>
+            <a:fillRect/>
+          </a:stretch>
+        </p:blipFill>
+        <p:spPr>
+          <a:xfrm>
+            <a:off x="7785715" y="981673"/>
+            <a:ext cx="3604333" cy="2200971"/>
+          </a:xfrm>
+          <a:prstGeom prst="rect">
+            <a:avLst/>
+          </a:prstGeom>
+        </p:spPr>
+      </p:pic>
+      <p:pic>
+        <p:nvPicPr>
+          <p:cNvPr id="11" name="图片 10">
+            <a:extLst>
+              <a:ext uri="{FF2B5EF4-FFF2-40B4-BE49-F238E27FC236}">
+                <a16:creationId xmlns:a16="http://schemas.microsoft.com/office/drawing/2014/main" id="{27B9F3E5-5A18-4E23-8E2E-C692769283DD}"/>
+              </a:ext>
+            </a:extLst>
+          </p:cNvPr>
+          <p:cNvPicPr>
+            <a:picLocks noChangeAspect="1"/>
+          </p:cNvPicPr>
+          <p:nvPr/>
+        </p:nvPicPr>
+        <p:blipFill>
+          <a:blip r:embed="rId5"/>
+          <a:stretch>
+            <a:fillRect/>
+          </a:stretch>
+        </p:blipFill>
+        <p:spPr>
+          <a:xfrm>
+            <a:off x="577049" y="3182644"/>
+            <a:ext cx="3604333" cy="2200971"/>
+          </a:xfrm>
+          <a:prstGeom prst="rect">
+            <a:avLst/>
+          </a:prstGeom>
+        </p:spPr>
+      </p:pic>
+      <p:pic>
+        <p:nvPicPr>
+          <p:cNvPr id="13" name="图片 12">
+            <a:extLst>
+              <a:ext uri="{FF2B5EF4-FFF2-40B4-BE49-F238E27FC236}">
+                <a16:creationId xmlns:a16="http://schemas.microsoft.com/office/drawing/2014/main" id="{D2E003CB-0B71-4C47-8AAE-31932F98BBC6}"/>
+              </a:ext>
+            </a:extLst>
+          </p:cNvPr>
+          <p:cNvPicPr>
+            <a:picLocks noChangeAspect="1"/>
+          </p:cNvPicPr>
+          <p:nvPr/>
+        </p:nvPicPr>
+        <p:blipFill>
+          <a:blip r:embed="rId6"/>
+          <a:stretch>
+            <a:fillRect/>
+          </a:stretch>
+        </p:blipFill>
+        <p:spPr>
+          <a:xfrm>
+            <a:off x="4181382" y="3182644"/>
+            <a:ext cx="3604333" cy="2200971"/>
+          </a:xfrm>
+          <a:prstGeom prst="rect">
+            <a:avLst/>
+          </a:prstGeom>
+        </p:spPr>
+      </p:pic>
+      <p:pic>
+        <p:nvPicPr>
+          <p:cNvPr id="15" name="图片 14">
+            <a:extLst>
+              <a:ext uri="{FF2B5EF4-FFF2-40B4-BE49-F238E27FC236}">
+                <a16:creationId xmlns:a16="http://schemas.microsoft.com/office/drawing/2014/main" id="{7978B90B-B8A7-49F3-AA0F-6E5DE92C867B}"/>
+              </a:ext>
+            </a:extLst>
+          </p:cNvPr>
+          <p:cNvPicPr>
+            <a:picLocks noChangeAspect="1"/>
+          </p:cNvPicPr>
+          <p:nvPr/>
+        </p:nvPicPr>
+        <p:blipFill>
+          <a:blip r:embed="rId7"/>
+          <a:stretch>
+            <a:fillRect/>
+          </a:stretch>
+        </p:blipFill>
+        <p:spPr>
+          <a:xfrm>
+            <a:off x="7785715" y="3182644"/>
+            <a:ext cx="3604333" cy="2200971"/>
+          </a:xfrm>
+          <a:prstGeom prst="rect">
+            <a:avLst/>
+          </a:prstGeom>
+        </p:spPr>
+      </p:pic>
+    </p:spTree>
+    <p:extLst>
+      <p:ext uri="{BB962C8B-B14F-4D97-AF65-F5344CB8AC3E}">
+        <p14:creationId xmlns:p14="http://schemas.microsoft.com/office/powerpoint/2010/main" val="588557117"/>
+      </p:ext>
+    </p:extLst>
+  </p:cSld>
+  <p:clrMapOvr>
+    <a:masterClrMapping/>
+  </p:clrMapOvr>
+</p:sld>
+</file>
+
 <file path=ppt/theme/theme1.xml><?xml version="1.0" encoding="utf-8"?>
 <a:theme xmlns:a="http://schemas.openxmlformats.org/drawingml/2006/main" name="Office 主题​​">
   <a:themeElements>

</xml_diff>